<commit_message>
:bug: fix Corrigido Modelo PPT
</commit_message>
<xml_diff>
--- a/Assinatura e-mail Schwarz.pptx
+++ b/Assinatura e-mail Schwarz.pptx
@@ -11,23 +11,16 @@
   <p:notesSz cx="6858000" cy="9144000"/>
   <p:embeddedFontLst>
     <p:embeddedFont>
-      <p:font typeface="Calibri" panose="020F0502020204030204" pitchFamily="34" charset="0"/>
+      <p:font typeface="Montserrat Classic" panose="020B0604020202020204" charset="0"/>
       <p:regular r:id="rId3"/>
-      <p:bold r:id="rId4"/>
-      <p:italic r:id="rId5"/>
-      <p:boldItalic r:id="rId6"/>
-    </p:embeddedFont>
-    <p:embeddedFont>
-      <p:font typeface="Montserrat Classic" panose="020B0604020202020204" charset="0"/>
-      <p:regular r:id="rId7"/>
     </p:embeddedFont>
     <p:embeddedFont>
       <p:font typeface="Montserrat Semi-Bold Bold" panose="020B0604020202020204" charset="0"/>
-      <p:regular r:id="rId8"/>
+      <p:regular r:id="rId4"/>
     </p:embeddedFont>
     <p:embeddedFont>
       <p:font typeface="Pathway Gothic One" panose="020B0604020202020204" charset="0"/>
-      <p:regular r:id="rId9"/>
+      <p:regular r:id="rId5"/>
     </p:embeddedFont>
   </p:embeddedFontLst>
   <p:defaultTextStyle>
@@ -324,7 +317,7 @@
             <a:fld id="{1D8BD707-D9CF-40AE-B4C6-C98DA3205C09}" type="datetimeFigureOut">
               <a:rPr lang="en-US" smtClean="0"/>
               <a:pPr/>
-              <a:t>8/29/2023</a:t>
+              <a:t>6/5/2024</a:t>
             </a:fld>
             <a:endParaRPr lang="en-US"/>
           </a:p>
@@ -489,7 +482,7 @@
             <a:fld id="{1D8BD707-D9CF-40AE-B4C6-C98DA3205C09}" type="datetimeFigureOut">
               <a:rPr lang="en-US" smtClean="0"/>
               <a:pPr/>
-              <a:t>8/29/2023</a:t>
+              <a:t>6/5/2024</a:t>
             </a:fld>
             <a:endParaRPr lang="en-US"/>
           </a:p>
@@ -664,7 +657,7 @@
             <a:fld id="{1D8BD707-D9CF-40AE-B4C6-C98DA3205C09}" type="datetimeFigureOut">
               <a:rPr lang="en-US" smtClean="0"/>
               <a:pPr/>
-              <a:t>8/29/2023</a:t>
+              <a:t>6/5/2024</a:t>
             </a:fld>
             <a:endParaRPr lang="en-US"/>
           </a:p>
@@ -829,7 +822,7 @@
             <a:fld id="{1D8BD707-D9CF-40AE-B4C6-C98DA3205C09}" type="datetimeFigureOut">
               <a:rPr lang="en-US" smtClean="0"/>
               <a:pPr/>
-              <a:t>8/29/2023</a:t>
+              <a:t>6/5/2024</a:t>
             </a:fld>
             <a:endParaRPr lang="en-US"/>
           </a:p>
@@ -1071,7 +1064,7 @@
             <a:fld id="{1D8BD707-D9CF-40AE-B4C6-C98DA3205C09}" type="datetimeFigureOut">
               <a:rPr lang="en-US" smtClean="0"/>
               <a:pPr/>
-              <a:t>8/29/2023</a:t>
+              <a:t>6/5/2024</a:t>
             </a:fld>
             <a:endParaRPr lang="en-US"/>
           </a:p>
@@ -1353,7 +1346,7 @@
             <a:fld id="{1D8BD707-D9CF-40AE-B4C6-C98DA3205C09}" type="datetimeFigureOut">
               <a:rPr lang="en-US" smtClean="0"/>
               <a:pPr/>
-              <a:t>8/29/2023</a:t>
+              <a:t>6/5/2024</a:t>
             </a:fld>
             <a:endParaRPr lang="en-US"/>
           </a:p>
@@ -1769,7 +1762,7 @@
             <a:fld id="{1D8BD707-D9CF-40AE-B4C6-C98DA3205C09}" type="datetimeFigureOut">
               <a:rPr lang="en-US" smtClean="0"/>
               <a:pPr/>
-              <a:t>8/29/2023</a:t>
+              <a:t>6/5/2024</a:t>
             </a:fld>
             <a:endParaRPr lang="en-US"/>
           </a:p>
@@ -1883,7 +1876,7 @@
             <a:fld id="{1D8BD707-D9CF-40AE-B4C6-C98DA3205C09}" type="datetimeFigureOut">
               <a:rPr lang="en-US" smtClean="0"/>
               <a:pPr/>
-              <a:t>8/29/2023</a:t>
+              <a:t>6/5/2024</a:t>
             </a:fld>
             <a:endParaRPr lang="en-US"/>
           </a:p>
@@ -1975,7 +1968,7 @@
             <a:fld id="{1D8BD707-D9CF-40AE-B4C6-C98DA3205C09}" type="datetimeFigureOut">
               <a:rPr lang="en-US" smtClean="0"/>
               <a:pPr/>
-              <a:t>8/29/2023</a:t>
+              <a:t>6/5/2024</a:t>
             </a:fld>
             <a:endParaRPr lang="en-US"/>
           </a:p>
@@ -2247,7 +2240,7 @@
             <a:fld id="{1D8BD707-D9CF-40AE-B4C6-C98DA3205C09}" type="datetimeFigureOut">
               <a:rPr lang="en-US" smtClean="0"/>
               <a:pPr/>
-              <a:t>8/29/2023</a:t>
+              <a:t>6/5/2024</a:t>
             </a:fld>
             <a:endParaRPr lang="en-US"/>
           </a:p>
@@ -2496,7 +2489,7 @@
             <a:fld id="{1D8BD707-D9CF-40AE-B4C6-C98DA3205C09}" type="datetimeFigureOut">
               <a:rPr lang="en-US" smtClean="0"/>
               <a:pPr/>
-              <a:t>8/29/2023</a:t>
+              <a:t>6/5/2024</a:t>
             </a:fld>
             <a:endParaRPr lang="en-US"/>
           </a:p>
@@ -2704,7 +2697,7 @@
             <a:fld id="{1D8BD707-D9CF-40AE-B4C6-C98DA3205C09}" type="datetimeFigureOut">
               <a:rPr lang="en-US" smtClean="0"/>
               <a:pPr/>
-              <a:t>8/29/2023</a:t>
+              <a:t>6/5/2024</a:t>
             </a:fld>
             <a:endParaRPr lang="en-US"/>
           </a:p>
@@ -3453,8 +3446,23 @@
                 </a:solidFill>
                 <a:latin typeface="Pathway Gothic One"/>
               </a:rPr>
-              <a:t>+55 (41) 2106-8700</a:t>
-            </a:r>
+              <a:t>+55 (41</a:t>
+            </a:r>
+            <a:r>
+              <a:rPr lang="en-US" sz="1800">
+                <a:solidFill>
+                  <a:srgbClr val="000000"/>
+                </a:solidFill>
+                <a:latin typeface="Pathway Gothic One"/>
+              </a:rPr>
+              <a:t>) 2106-RAMAL</a:t>
+            </a:r>
+            <a:endParaRPr lang="en-US" sz="1800" dirty="0">
+              <a:solidFill>
+                <a:srgbClr val="000000"/>
+              </a:solidFill>
+              <a:latin typeface="Pathway Gothic One"/>
+            </a:endParaRPr>
           </a:p>
         </p:txBody>
       </p:sp>

</xml_diff>

<commit_message>
Atualizar Modelo PPTX de Assinatura
</commit_message>
<xml_diff>
--- a/Assinatura e-mail Schwarz.pptx
+++ b/Assinatura e-mail Schwarz.pptx
@@ -7,7 +7,7 @@
   <p:sldIdLst>
     <p:sldId id="257" r:id="rId2"/>
   </p:sldIdLst>
-  <p:sldSz cx="7380288" cy="2476500"/>
+  <p:sldSz cx="4967288" cy="1403350"/>
   <p:notesSz cx="6858000" cy="9144000"/>
   <p:embeddedFontLst>
     <p:embeddedFont>
@@ -27,8 +27,8 @@
     <a:defPPr>
       <a:defRPr lang="en-US"/>
     </a:defPPr>
-    <a:lvl1pPr marL="0" algn="l" defTabSz="1509949" rtl="0" eaLnBrk="1" latinLnBrk="0" hangingPunct="1">
-      <a:defRPr sz="2972" kern="1200">
+    <a:lvl1pPr marL="0" algn="l" defTabSz="1185480" rtl="0" eaLnBrk="1" latinLnBrk="0" hangingPunct="1">
+      <a:defRPr sz="2334" kern="1200">
         <a:solidFill>
           <a:schemeClr val="tx1"/>
         </a:solidFill>
@@ -37,8 +37,8 @@
         <a:cs typeface="+mn-cs"/>
       </a:defRPr>
     </a:lvl1pPr>
-    <a:lvl2pPr marL="754974" algn="l" defTabSz="1509949" rtl="0" eaLnBrk="1" latinLnBrk="0" hangingPunct="1">
-      <a:defRPr sz="2972" kern="1200">
+    <a:lvl2pPr marL="592740" algn="l" defTabSz="1185480" rtl="0" eaLnBrk="1" latinLnBrk="0" hangingPunct="1">
+      <a:defRPr sz="2334" kern="1200">
         <a:solidFill>
           <a:schemeClr val="tx1"/>
         </a:solidFill>
@@ -47,8 +47,8 @@
         <a:cs typeface="+mn-cs"/>
       </a:defRPr>
     </a:lvl2pPr>
-    <a:lvl3pPr marL="1509949" algn="l" defTabSz="1509949" rtl="0" eaLnBrk="1" latinLnBrk="0" hangingPunct="1">
-      <a:defRPr sz="2972" kern="1200">
+    <a:lvl3pPr marL="1185480" algn="l" defTabSz="1185480" rtl="0" eaLnBrk="1" latinLnBrk="0" hangingPunct="1">
+      <a:defRPr sz="2334" kern="1200">
         <a:solidFill>
           <a:schemeClr val="tx1"/>
         </a:solidFill>
@@ -57,8 +57,8 @@
         <a:cs typeface="+mn-cs"/>
       </a:defRPr>
     </a:lvl3pPr>
-    <a:lvl4pPr marL="2264923" algn="l" defTabSz="1509949" rtl="0" eaLnBrk="1" latinLnBrk="0" hangingPunct="1">
-      <a:defRPr sz="2972" kern="1200">
+    <a:lvl4pPr marL="1778220" algn="l" defTabSz="1185480" rtl="0" eaLnBrk="1" latinLnBrk="0" hangingPunct="1">
+      <a:defRPr sz="2334" kern="1200">
         <a:solidFill>
           <a:schemeClr val="tx1"/>
         </a:solidFill>
@@ -67,8 +67,8 @@
         <a:cs typeface="+mn-cs"/>
       </a:defRPr>
     </a:lvl4pPr>
-    <a:lvl5pPr marL="3019897" algn="l" defTabSz="1509949" rtl="0" eaLnBrk="1" latinLnBrk="0" hangingPunct="1">
-      <a:defRPr sz="2972" kern="1200">
+    <a:lvl5pPr marL="2370959" algn="l" defTabSz="1185480" rtl="0" eaLnBrk="1" latinLnBrk="0" hangingPunct="1">
+      <a:defRPr sz="2334" kern="1200">
         <a:solidFill>
           <a:schemeClr val="tx1"/>
         </a:solidFill>
@@ -77,8 +77,8 @@
         <a:cs typeface="+mn-cs"/>
       </a:defRPr>
     </a:lvl5pPr>
-    <a:lvl6pPr marL="3774872" algn="l" defTabSz="1509949" rtl="0" eaLnBrk="1" latinLnBrk="0" hangingPunct="1">
-      <a:defRPr sz="2972" kern="1200">
+    <a:lvl6pPr marL="2963700" algn="l" defTabSz="1185480" rtl="0" eaLnBrk="1" latinLnBrk="0" hangingPunct="1">
+      <a:defRPr sz="2334" kern="1200">
         <a:solidFill>
           <a:schemeClr val="tx1"/>
         </a:solidFill>
@@ -87,8 +87,8 @@
         <a:cs typeface="+mn-cs"/>
       </a:defRPr>
     </a:lvl6pPr>
-    <a:lvl7pPr marL="4529846" algn="l" defTabSz="1509949" rtl="0" eaLnBrk="1" latinLnBrk="0" hangingPunct="1">
-      <a:defRPr sz="2972" kern="1200">
+    <a:lvl7pPr marL="3556440" algn="l" defTabSz="1185480" rtl="0" eaLnBrk="1" latinLnBrk="0" hangingPunct="1">
+      <a:defRPr sz="2334" kern="1200">
         <a:solidFill>
           <a:schemeClr val="tx1"/>
         </a:solidFill>
@@ -97,8 +97,8 @@
         <a:cs typeface="+mn-cs"/>
       </a:defRPr>
     </a:lvl7pPr>
-    <a:lvl8pPr marL="5284821" algn="l" defTabSz="1509949" rtl="0" eaLnBrk="1" latinLnBrk="0" hangingPunct="1">
-      <a:defRPr sz="2972" kern="1200">
+    <a:lvl8pPr marL="4149180" algn="l" defTabSz="1185480" rtl="0" eaLnBrk="1" latinLnBrk="0" hangingPunct="1">
+      <a:defRPr sz="2334" kern="1200">
         <a:solidFill>
           <a:schemeClr val="tx1"/>
         </a:solidFill>
@@ -107,8 +107,8 @@
         <a:cs typeface="+mn-cs"/>
       </a:defRPr>
     </a:lvl8pPr>
-    <a:lvl9pPr marL="6039795" algn="l" defTabSz="1509949" rtl="0" eaLnBrk="1" latinLnBrk="0" hangingPunct="1">
-      <a:defRPr sz="2972" kern="1200">
+    <a:lvl9pPr marL="4741920" algn="l" defTabSz="1185480" rtl="0" eaLnBrk="1" latinLnBrk="0" hangingPunct="1">
+      <a:defRPr sz="2334" kern="1200">
         <a:solidFill>
           <a:schemeClr val="tx1"/>
         </a:solidFill>
@@ -121,12 +121,12 @@
   <p:extLst>
     <p:ext uri="{EFAFB233-063F-42B5-8137-9DF3F51BA10A}">
       <p15:sldGuideLst xmlns:p15="http://schemas.microsoft.com/office/powerpoint/2012/main">
-        <p15:guide id="1" orient="horz" pos="3829" userDrawn="1">
+        <p15:guide id="1" orient="horz" pos="2170" userDrawn="1">
           <p15:clr>
             <a:srgbClr val="A4A3A4"/>
           </p15:clr>
         </p15:guide>
-        <p15:guide id="2" pos="4809" userDrawn="1">
+        <p15:guide id="2" pos="3237" userDrawn="1">
           <p15:clr>
             <a:srgbClr val="A4A3A4"/>
           </p15:clr>
@@ -166,8 +166,8 @@
         </p:nvSpPr>
         <p:spPr>
           <a:xfrm>
-            <a:off x="1145225" y="3776669"/>
-            <a:ext cx="12979126" cy="2605953"/>
+            <a:off x="770794" y="2140116"/>
+            <a:ext cx="8735574" cy="1476707"/>
           </a:xfrm>
         </p:spPr>
         <p:txBody>
@@ -193,8 +193,8 @@
         </p:nvSpPr>
         <p:spPr>
           <a:xfrm>
-            <a:off x="2290441" y="6889173"/>
-            <a:ext cx="10688694" cy="3106882"/>
+            <a:off x="1541578" y="3903867"/>
+            <a:ext cx="7194003" cy="1760567"/>
           </a:xfrm>
         </p:spPr>
         <p:txBody>
@@ -210,7 +210,7 @@
                 </a:solidFill>
               </a:defRPr>
             </a:lvl1pPr>
-            <a:lvl2pPr marL="369902" indent="0" algn="ctr">
+            <a:lvl2pPr marL="265886" indent="0" algn="ctr">
               <a:buNone/>
               <a:defRPr>
                 <a:solidFill>
@@ -220,7 +220,7 @@
                 </a:solidFill>
               </a:defRPr>
             </a:lvl2pPr>
-            <a:lvl3pPr marL="739808" indent="0" algn="ctr">
+            <a:lvl3pPr marL="531774" indent="0" algn="ctr">
               <a:buNone/>
               <a:defRPr>
                 <a:solidFill>
@@ -230,7 +230,7 @@
                 </a:solidFill>
               </a:defRPr>
             </a:lvl3pPr>
-            <a:lvl4pPr marL="1109709" indent="0" algn="ctr">
+            <a:lvl4pPr marL="797659" indent="0" algn="ctr">
               <a:buNone/>
               <a:defRPr>
                 <a:solidFill>
@@ -240,7 +240,7 @@
                 </a:solidFill>
               </a:defRPr>
             </a:lvl4pPr>
-            <a:lvl5pPr marL="1479613" indent="0" algn="ctr">
+            <a:lvl5pPr marL="1063546" indent="0" algn="ctr">
               <a:buNone/>
               <a:defRPr>
                 <a:solidFill>
@@ -250,7 +250,7 @@
                 </a:solidFill>
               </a:defRPr>
             </a:lvl5pPr>
-            <a:lvl6pPr marL="1849517" indent="0" algn="ctr">
+            <a:lvl6pPr marL="1329433" indent="0" algn="ctr">
               <a:buNone/>
               <a:defRPr>
                 <a:solidFill>
@@ -260,7 +260,7 @@
                 </a:solidFill>
               </a:defRPr>
             </a:lvl6pPr>
-            <a:lvl7pPr marL="2219419" indent="0" algn="ctr">
+            <a:lvl7pPr marL="1595318" indent="0" algn="ctr">
               <a:buNone/>
               <a:defRPr>
                 <a:solidFill>
@@ -270,7 +270,7 @@
                 </a:solidFill>
               </a:defRPr>
             </a:lvl7pPr>
-            <a:lvl8pPr marL="2589323" indent="0" algn="ctr">
+            <a:lvl8pPr marL="1861205" indent="0" algn="ctr">
               <a:buNone/>
               <a:defRPr>
                 <a:solidFill>
@@ -280,7 +280,7 @@
                 </a:solidFill>
               </a:defRPr>
             </a:lvl8pPr>
-            <a:lvl9pPr marL="2959226" indent="0" algn="ctr">
+            <a:lvl9pPr marL="2127092" indent="0" algn="ctr">
               <a:buNone/>
               <a:defRPr>
                 <a:solidFill>
@@ -317,7 +317,7 @@
             <a:fld id="{1D8BD707-D9CF-40AE-B4C6-C98DA3205C09}" type="datetimeFigureOut">
               <a:rPr lang="en-US" smtClean="0"/>
               <a:pPr/>
-              <a:t>6/5/2024</a:t>
+              <a:t>6/6/2024</a:t>
             </a:fld>
             <a:endParaRPr lang="en-US"/>
           </a:p>
@@ -482,7 +482,7 @@
             <a:fld id="{1D8BD707-D9CF-40AE-B4C6-C98DA3205C09}" type="datetimeFigureOut">
               <a:rPr lang="en-US" smtClean="0"/>
               <a:pPr/>
-              <a:t>6/5/2024</a:t>
+              <a:t>6/6/2024</a:t>
             </a:fld>
             <a:endParaRPr lang="en-US"/>
           </a:p>
@@ -568,8 +568,8 @@
         </p:nvSpPr>
         <p:spPr>
           <a:xfrm>
-            <a:off x="11070435" y="486863"/>
-            <a:ext cx="3435653" cy="10373158"/>
+            <a:off x="7450936" y="275894"/>
+            <a:ext cx="2312359" cy="5878123"/>
           </a:xfrm>
         </p:spPr>
         <p:txBody>
@@ -595,8 +595,8 @@
         </p:nvSpPr>
         <p:spPr>
           <a:xfrm>
-            <a:off x="763480" y="486863"/>
-            <a:ext cx="10052464" cy="10373158"/>
+            <a:off x="513863" y="275894"/>
+            <a:ext cx="6765790" cy="5878123"/>
           </a:xfrm>
         </p:spPr>
         <p:txBody>
@@ -657,7 +657,7 @@
             <a:fld id="{1D8BD707-D9CF-40AE-B4C6-C98DA3205C09}" type="datetimeFigureOut">
               <a:rPr lang="en-US" smtClean="0"/>
               <a:pPr/>
-              <a:t>6/5/2024</a:t>
+              <a:t>6/6/2024</a:t>
             </a:fld>
             <a:endParaRPr lang="en-US"/>
           </a:p>
@@ -822,7 +822,7 @@
             <a:fld id="{1D8BD707-D9CF-40AE-B4C6-C98DA3205C09}" type="datetimeFigureOut">
               <a:rPr lang="en-US" smtClean="0"/>
               <a:pPr/>
-              <a:t>6/5/2024</a:t>
+              <a:t>6/6/2024</a:t>
             </a:fld>
             <a:endParaRPr lang="en-US"/>
           </a:p>
@@ -908,15 +908,15 @@
         </p:nvSpPr>
         <p:spPr>
           <a:xfrm>
-            <a:off x="1206198" y="7812252"/>
-            <a:ext cx="12979126" cy="2414588"/>
+            <a:off x="811832" y="4426946"/>
+            <a:ext cx="8735574" cy="1368267"/>
           </a:xfrm>
         </p:spPr>
         <p:txBody>
           <a:bodyPr anchor="t"/>
           <a:lstStyle>
             <a:lvl1pPr algn="l">
-              <a:defRPr sz="3235" b="1" cap="all"/>
+              <a:defRPr sz="2325" b="1" cap="all"/>
             </a:lvl1pPr>
           </a:lstStyle>
           <a:p>
@@ -939,8 +939,8 @@
         </p:nvSpPr>
         <p:spPr>
           <a:xfrm>
-            <a:off x="1206198" y="5152814"/>
-            <a:ext cx="12979126" cy="2659422"/>
+            <a:off x="811832" y="2919930"/>
+            <a:ext cx="8735574" cy="1507006"/>
           </a:xfrm>
         </p:spPr>
         <p:txBody>
@@ -948,7 +948,7 @@
           <a:lstStyle>
             <a:lvl1pPr marL="0" indent="0">
               <a:buNone/>
-              <a:defRPr sz="1619">
+              <a:defRPr sz="1164">
                 <a:solidFill>
                   <a:schemeClr val="tx1">
                     <a:tint val="75000"/>
@@ -956,9 +956,9 @@
                 </a:solidFill>
               </a:defRPr>
             </a:lvl1pPr>
-            <a:lvl2pPr marL="369902" indent="0">
-              <a:buNone/>
-              <a:defRPr sz="1457">
+            <a:lvl2pPr marL="265886" indent="0">
+              <a:buNone/>
+              <a:defRPr sz="1047">
                 <a:solidFill>
                   <a:schemeClr val="tx1">
                     <a:tint val="75000"/>
@@ -966,9 +966,9 @@
                 </a:solidFill>
               </a:defRPr>
             </a:lvl2pPr>
-            <a:lvl3pPr marL="739808" indent="0">
-              <a:buNone/>
-              <a:defRPr sz="1295">
+            <a:lvl3pPr marL="531774" indent="0">
+              <a:buNone/>
+              <a:defRPr sz="931">
                 <a:solidFill>
                   <a:schemeClr val="tx1">
                     <a:tint val="75000"/>
@@ -976,9 +976,9 @@
                 </a:solidFill>
               </a:defRPr>
             </a:lvl3pPr>
-            <a:lvl4pPr marL="1109709" indent="0">
-              <a:buNone/>
-              <a:defRPr sz="1132">
+            <a:lvl4pPr marL="797659" indent="0">
+              <a:buNone/>
+              <a:defRPr sz="814">
                 <a:solidFill>
                   <a:schemeClr val="tx1">
                     <a:tint val="75000"/>
@@ -986,9 +986,9 @@
                 </a:solidFill>
               </a:defRPr>
             </a:lvl4pPr>
-            <a:lvl5pPr marL="1479613" indent="0">
-              <a:buNone/>
-              <a:defRPr sz="1132">
+            <a:lvl5pPr marL="1063546" indent="0">
+              <a:buNone/>
+              <a:defRPr sz="814">
                 <a:solidFill>
                   <a:schemeClr val="tx1">
                     <a:tint val="75000"/>
@@ -996,9 +996,9 @@
                 </a:solidFill>
               </a:defRPr>
             </a:lvl5pPr>
-            <a:lvl6pPr marL="1849517" indent="0">
-              <a:buNone/>
-              <a:defRPr sz="1132">
+            <a:lvl6pPr marL="1329433" indent="0">
+              <a:buNone/>
+              <a:defRPr sz="814">
                 <a:solidFill>
                   <a:schemeClr val="tx1">
                     <a:tint val="75000"/>
@@ -1006,9 +1006,9 @@
                 </a:solidFill>
               </a:defRPr>
             </a:lvl6pPr>
-            <a:lvl7pPr marL="2219419" indent="0">
-              <a:buNone/>
-              <a:defRPr sz="1132">
+            <a:lvl7pPr marL="1595318" indent="0">
+              <a:buNone/>
+              <a:defRPr sz="814">
                 <a:solidFill>
                   <a:schemeClr val="tx1">
                     <a:tint val="75000"/>
@@ -1016,9 +1016,9 @@
                 </a:solidFill>
               </a:defRPr>
             </a:lvl7pPr>
-            <a:lvl8pPr marL="2589323" indent="0">
-              <a:buNone/>
-              <a:defRPr sz="1132">
+            <a:lvl8pPr marL="1861205" indent="0">
+              <a:buNone/>
+              <a:defRPr sz="814">
                 <a:solidFill>
                   <a:schemeClr val="tx1">
                     <a:tint val="75000"/>
@@ -1026,9 +1026,9 @@
                 </a:solidFill>
               </a:defRPr>
             </a:lvl8pPr>
-            <a:lvl9pPr marL="2959226" indent="0">
-              <a:buNone/>
-              <a:defRPr sz="1132">
+            <a:lvl9pPr marL="2127092" indent="0">
+              <a:buNone/>
+              <a:defRPr sz="814">
                 <a:solidFill>
                   <a:schemeClr val="tx1">
                     <a:tint val="75000"/>
@@ -1064,7 +1064,7 @@
             <a:fld id="{1D8BD707-D9CF-40AE-B4C6-C98DA3205C09}" type="datetimeFigureOut">
               <a:rPr lang="en-US" smtClean="0"/>
               <a:pPr/>
-              <a:t>6/5/2024</a:t>
+              <a:t>6/6/2024</a:t>
             </a:fld>
             <a:endParaRPr lang="en-US"/>
           </a:p>
@@ -1172,39 +1172,39 @@
         </p:nvSpPr>
         <p:spPr>
           <a:xfrm>
-            <a:off x="763476" y="2836726"/>
-            <a:ext cx="6744059" cy="8023298"/>
+            <a:off x="513858" y="1607478"/>
+            <a:ext cx="4539077" cy="4546536"/>
           </a:xfrm>
         </p:spPr>
         <p:txBody>
           <a:bodyPr/>
           <a:lstStyle>
             <a:lvl1pPr>
-              <a:defRPr sz="2265"/>
+              <a:defRPr sz="1628"/>
             </a:lvl1pPr>
             <a:lvl2pPr>
-              <a:defRPr sz="1943"/>
+              <a:defRPr sz="1397"/>
             </a:lvl2pPr>
             <a:lvl3pPr>
-              <a:defRPr sz="1619"/>
+              <a:defRPr sz="1164"/>
             </a:lvl3pPr>
             <a:lvl4pPr>
-              <a:defRPr sz="1457"/>
+              <a:defRPr sz="1047"/>
             </a:lvl4pPr>
             <a:lvl5pPr>
-              <a:defRPr sz="1457"/>
+              <a:defRPr sz="1047"/>
             </a:lvl5pPr>
             <a:lvl6pPr>
-              <a:defRPr sz="1457"/>
+              <a:defRPr sz="1047"/>
             </a:lvl6pPr>
             <a:lvl7pPr>
-              <a:defRPr sz="1457"/>
+              <a:defRPr sz="1047"/>
             </a:lvl7pPr>
             <a:lvl8pPr>
-              <a:defRPr sz="1457"/>
+              <a:defRPr sz="1047"/>
             </a:lvl8pPr>
             <a:lvl9pPr>
-              <a:defRPr sz="1457"/>
+              <a:defRPr sz="1047"/>
             </a:lvl9pPr>
           </a:lstStyle>
           <a:p>
@@ -1256,39 +1256,39 @@
         </p:nvSpPr>
         <p:spPr>
           <a:xfrm>
-            <a:off x="7762026" y="2836726"/>
-            <a:ext cx="6744059" cy="8023298"/>
+            <a:off x="5224217" y="1607478"/>
+            <a:ext cx="4539077" cy="4546536"/>
           </a:xfrm>
         </p:spPr>
         <p:txBody>
           <a:bodyPr/>
           <a:lstStyle>
             <a:lvl1pPr>
-              <a:defRPr sz="2265"/>
+              <a:defRPr sz="1628"/>
             </a:lvl1pPr>
             <a:lvl2pPr>
-              <a:defRPr sz="1943"/>
+              <a:defRPr sz="1397"/>
             </a:lvl2pPr>
             <a:lvl3pPr>
-              <a:defRPr sz="1619"/>
+              <a:defRPr sz="1164"/>
             </a:lvl3pPr>
             <a:lvl4pPr>
-              <a:defRPr sz="1457"/>
+              <a:defRPr sz="1047"/>
             </a:lvl4pPr>
             <a:lvl5pPr>
-              <a:defRPr sz="1457"/>
+              <a:defRPr sz="1047"/>
             </a:lvl5pPr>
             <a:lvl6pPr>
-              <a:defRPr sz="1457"/>
+              <a:defRPr sz="1047"/>
             </a:lvl6pPr>
             <a:lvl7pPr>
-              <a:defRPr sz="1457"/>
+              <a:defRPr sz="1047"/>
             </a:lvl7pPr>
             <a:lvl8pPr>
-              <a:defRPr sz="1457"/>
+              <a:defRPr sz="1047"/>
             </a:lvl8pPr>
             <a:lvl9pPr>
-              <a:defRPr sz="1457"/>
+              <a:defRPr sz="1047"/>
             </a:lvl9pPr>
           </a:lstStyle>
           <a:p>
@@ -1346,7 +1346,7 @@
             <a:fld id="{1D8BD707-D9CF-40AE-B4C6-C98DA3205C09}" type="datetimeFigureOut">
               <a:rPr lang="en-US" smtClean="0"/>
               <a:pPr/>
-              <a:t>6/5/2024</a:t>
+              <a:t>6/6/2024</a:t>
             </a:fld>
             <a:endParaRPr lang="en-US"/>
           </a:p>
@@ -1458,8 +1458,8 @@
         </p:nvSpPr>
         <p:spPr>
           <a:xfrm>
-            <a:off x="763484" y="2721336"/>
-            <a:ext cx="6746707" cy="1134124"/>
+            <a:off x="513866" y="1542090"/>
+            <a:ext cx="4540857" cy="642670"/>
           </a:xfrm>
         </p:spPr>
         <p:txBody>
@@ -1467,39 +1467,39 @@
           <a:lstStyle>
             <a:lvl1pPr marL="0" indent="0">
               <a:buNone/>
-              <a:defRPr sz="1943" b="1"/>
+              <a:defRPr sz="1397" b="1"/>
             </a:lvl1pPr>
-            <a:lvl2pPr marL="369902" indent="0">
-              <a:buNone/>
-              <a:defRPr sz="1619" b="1"/>
+            <a:lvl2pPr marL="265886" indent="0">
+              <a:buNone/>
+              <a:defRPr sz="1164" b="1"/>
             </a:lvl2pPr>
-            <a:lvl3pPr marL="739808" indent="0">
-              <a:buNone/>
-              <a:defRPr sz="1457" b="1"/>
+            <a:lvl3pPr marL="531774" indent="0">
+              <a:buNone/>
+              <a:defRPr sz="1047" b="1"/>
             </a:lvl3pPr>
-            <a:lvl4pPr marL="1109709" indent="0">
-              <a:buNone/>
-              <a:defRPr sz="1295" b="1"/>
+            <a:lvl4pPr marL="797659" indent="0">
+              <a:buNone/>
+              <a:defRPr sz="931" b="1"/>
             </a:lvl4pPr>
-            <a:lvl5pPr marL="1479613" indent="0">
-              <a:buNone/>
-              <a:defRPr sz="1295" b="1"/>
+            <a:lvl5pPr marL="1063546" indent="0">
+              <a:buNone/>
+              <a:defRPr sz="931" b="1"/>
             </a:lvl5pPr>
-            <a:lvl6pPr marL="1849517" indent="0">
-              <a:buNone/>
-              <a:defRPr sz="1295" b="1"/>
+            <a:lvl6pPr marL="1329433" indent="0">
+              <a:buNone/>
+              <a:defRPr sz="931" b="1"/>
             </a:lvl6pPr>
-            <a:lvl7pPr marL="2219419" indent="0">
-              <a:buNone/>
-              <a:defRPr sz="1295" b="1"/>
+            <a:lvl7pPr marL="1595318" indent="0">
+              <a:buNone/>
+              <a:defRPr sz="931" b="1"/>
             </a:lvl7pPr>
-            <a:lvl8pPr marL="2589323" indent="0">
-              <a:buNone/>
-              <a:defRPr sz="1295" b="1"/>
+            <a:lvl8pPr marL="1861205" indent="0">
+              <a:buNone/>
+              <a:defRPr sz="931" b="1"/>
             </a:lvl8pPr>
-            <a:lvl9pPr marL="2959226" indent="0">
-              <a:buNone/>
-              <a:defRPr sz="1295" b="1"/>
+            <a:lvl9pPr marL="2127092" indent="0">
+              <a:buNone/>
+              <a:defRPr sz="931" b="1"/>
             </a:lvl9pPr>
           </a:lstStyle>
           <a:p>
@@ -1523,39 +1523,39 @@
         </p:nvSpPr>
         <p:spPr>
           <a:xfrm>
-            <a:off x="763484" y="3855460"/>
-            <a:ext cx="6746707" cy="7004556"/>
+            <a:off x="513866" y="2184762"/>
+            <a:ext cx="4540857" cy="3969248"/>
           </a:xfrm>
         </p:spPr>
         <p:txBody>
           <a:bodyPr/>
           <a:lstStyle>
             <a:lvl1pPr>
-              <a:defRPr sz="1943"/>
+              <a:defRPr sz="1397"/>
             </a:lvl1pPr>
             <a:lvl2pPr>
-              <a:defRPr sz="1619"/>
+              <a:defRPr sz="1164"/>
             </a:lvl2pPr>
             <a:lvl3pPr>
-              <a:defRPr sz="1457"/>
+              <a:defRPr sz="1047"/>
             </a:lvl3pPr>
             <a:lvl4pPr>
-              <a:defRPr sz="1295"/>
+              <a:defRPr sz="931"/>
             </a:lvl4pPr>
             <a:lvl5pPr>
-              <a:defRPr sz="1295"/>
+              <a:defRPr sz="931"/>
             </a:lvl5pPr>
             <a:lvl6pPr>
-              <a:defRPr sz="1295"/>
+              <a:defRPr sz="931"/>
             </a:lvl6pPr>
             <a:lvl7pPr>
-              <a:defRPr sz="1295"/>
+              <a:defRPr sz="931"/>
             </a:lvl7pPr>
             <a:lvl8pPr>
-              <a:defRPr sz="1295"/>
+              <a:defRPr sz="931"/>
             </a:lvl8pPr>
             <a:lvl9pPr>
-              <a:defRPr sz="1295"/>
+              <a:defRPr sz="931"/>
             </a:lvl9pPr>
           </a:lstStyle>
           <a:p>
@@ -1607,8 +1607,8 @@
         </p:nvSpPr>
         <p:spPr>
           <a:xfrm>
-            <a:off x="7756734" y="2721336"/>
-            <a:ext cx="6749359" cy="1134124"/>
+            <a:off x="5220658" y="1542090"/>
+            <a:ext cx="4542642" cy="642670"/>
           </a:xfrm>
         </p:spPr>
         <p:txBody>
@@ -1616,39 +1616,39 @@
           <a:lstStyle>
             <a:lvl1pPr marL="0" indent="0">
               <a:buNone/>
-              <a:defRPr sz="1943" b="1"/>
+              <a:defRPr sz="1397" b="1"/>
             </a:lvl1pPr>
-            <a:lvl2pPr marL="369902" indent="0">
-              <a:buNone/>
-              <a:defRPr sz="1619" b="1"/>
+            <a:lvl2pPr marL="265886" indent="0">
+              <a:buNone/>
+              <a:defRPr sz="1164" b="1"/>
             </a:lvl2pPr>
-            <a:lvl3pPr marL="739808" indent="0">
-              <a:buNone/>
-              <a:defRPr sz="1457" b="1"/>
+            <a:lvl3pPr marL="531774" indent="0">
+              <a:buNone/>
+              <a:defRPr sz="1047" b="1"/>
             </a:lvl3pPr>
-            <a:lvl4pPr marL="1109709" indent="0">
-              <a:buNone/>
-              <a:defRPr sz="1295" b="1"/>
+            <a:lvl4pPr marL="797659" indent="0">
+              <a:buNone/>
+              <a:defRPr sz="931" b="1"/>
             </a:lvl4pPr>
-            <a:lvl5pPr marL="1479613" indent="0">
-              <a:buNone/>
-              <a:defRPr sz="1295" b="1"/>
+            <a:lvl5pPr marL="1063546" indent="0">
+              <a:buNone/>
+              <a:defRPr sz="931" b="1"/>
             </a:lvl5pPr>
-            <a:lvl6pPr marL="1849517" indent="0">
-              <a:buNone/>
-              <a:defRPr sz="1295" b="1"/>
+            <a:lvl6pPr marL="1329433" indent="0">
+              <a:buNone/>
+              <a:defRPr sz="931" b="1"/>
             </a:lvl6pPr>
-            <a:lvl7pPr marL="2219419" indent="0">
-              <a:buNone/>
-              <a:defRPr sz="1295" b="1"/>
+            <a:lvl7pPr marL="1595318" indent="0">
+              <a:buNone/>
+              <a:defRPr sz="931" b="1"/>
             </a:lvl7pPr>
-            <a:lvl8pPr marL="2589323" indent="0">
-              <a:buNone/>
-              <a:defRPr sz="1295" b="1"/>
+            <a:lvl8pPr marL="1861205" indent="0">
+              <a:buNone/>
+              <a:defRPr sz="931" b="1"/>
             </a:lvl8pPr>
-            <a:lvl9pPr marL="2959226" indent="0">
-              <a:buNone/>
-              <a:defRPr sz="1295" b="1"/>
+            <a:lvl9pPr marL="2127092" indent="0">
+              <a:buNone/>
+              <a:defRPr sz="931" b="1"/>
             </a:lvl9pPr>
           </a:lstStyle>
           <a:p>
@@ -1672,39 +1672,39 @@
         </p:nvSpPr>
         <p:spPr>
           <a:xfrm>
-            <a:off x="7756734" y="3855460"/>
-            <a:ext cx="6749359" cy="7004556"/>
+            <a:off x="5220658" y="2184762"/>
+            <a:ext cx="4542642" cy="3969248"/>
           </a:xfrm>
         </p:spPr>
         <p:txBody>
           <a:bodyPr/>
           <a:lstStyle>
             <a:lvl1pPr>
-              <a:defRPr sz="1943"/>
+              <a:defRPr sz="1397"/>
             </a:lvl1pPr>
             <a:lvl2pPr>
-              <a:defRPr sz="1619"/>
+              <a:defRPr sz="1164"/>
             </a:lvl2pPr>
             <a:lvl3pPr>
-              <a:defRPr sz="1457"/>
+              <a:defRPr sz="1047"/>
             </a:lvl3pPr>
             <a:lvl4pPr>
-              <a:defRPr sz="1295"/>
+              <a:defRPr sz="931"/>
             </a:lvl4pPr>
             <a:lvl5pPr>
-              <a:defRPr sz="1295"/>
+              <a:defRPr sz="931"/>
             </a:lvl5pPr>
             <a:lvl6pPr>
-              <a:defRPr sz="1295"/>
+              <a:defRPr sz="931"/>
             </a:lvl6pPr>
             <a:lvl7pPr>
-              <a:defRPr sz="1295"/>
+              <a:defRPr sz="931"/>
             </a:lvl7pPr>
             <a:lvl8pPr>
-              <a:defRPr sz="1295"/>
+              <a:defRPr sz="931"/>
             </a:lvl8pPr>
             <a:lvl9pPr>
-              <a:defRPr sz="1295"/>
+              <a:defRPr sz="931"/>
             </a:lvl9pPr>
           </a:lstStyle>
           <a:p>
@@ -1762,7 +1762,7 @@
             <a:fld id="{1D8BD707-D9CF-40AE-B4C6-C98DA3205C09}" type="datetimeFigureOut">
               <a:rPr lang="en-US" smtClean="0"/>
               <a:pPr/>
-              <a:t>6/5/2024</a:t>
+              <a:t>6/6/2024</a:t>
             </a:fld>
             <a:endParaRPr lang="en-US"/>
           </a:p>
@@ -1876,7 +1876,7 @@
             <a:fld id="{1D8BD707-D9CF-40AE-B4C6-C98DA3205C09}" type="datetimeFigureOut">
               <a:rPr lang="en-US" smtClean="0"/>
               <a:pPr/>
-              <a:t>6/5/2024</a:t>
+              <a:t>6/6/2024</a:t>
             </a:fld>
             <a:endParaRPr lang="en-US"/>
           </a:p>
@@ -1968,7 +1968,7 @@
             <a:fld id="{1D8BD707-D9CF-40AE-B4C6-C98DA3205C09}" type="datetimeFigureOut">
               <a:rPr lang="en-US" smtClean="0"/>
               <a:pPr/>
-              <a:t>6/5/2024</a:t>
+              <a:t>6/6/2024</a:t>
             </a:fld>
             <a:endParaRPr lang="en-US"/>
           </a:p>
@@ -2054,15 +2054,15 @@
         </p:nvSpPr>
         <p:spPr>
           <a:xfrm>
-            <a:off x="763483" y="484043"/>
-            <a:ext cx="5023581" cy="2059998"/>
+            <a:off x="513864" y="274292"/>
+            <a:ext cx="3381110" cy="1167332"/>
           </a:xfrm>
         </p:spPr>
         <p:txBody>
           <a:bodyPr anchor="b"/>
           <a:lstStyle>
             <a:lvl1pPr algn="l">
-              <a:defRPr sz="1619" b="1"/>
+              <a:defRPr sz="1164" b="1"/>
             </a:lvl1pPr>
           </a:lstStyle>
           <a:p>
@@ -2085,39 +2085,39 @@
         </p:nvSpPr>
         <p:spPr>
           <a:xfrm>
-            <a:off x="5969982" y="484049"/>
-            <a:ext cx="8536112" cy="10375973"/>
+            <a:off x="4018087" y="274297"/>
+            <a:ext cx="5745213" cy="5879718"/>
           </a:xfrm>
         </p:spPr>
         <p:txBody>
           <a:bodyPr/>
           <a:lstStyle>
             <a:lvl1pPr>
-              <a:defRPr sz="2589"/>
+              <a:defRPr sz="1861"/>
             </a:lvl1pPr>
             <a:lvl2pPr>
-              <a:defRPr sz="2265"/>
+              <a:defRPr sz="1628"/>
             </a:lvl2pPr>
             <a:lvl3pPr>
-              <a:defRPr sz="1943"/>
+              <a:defRPr sz="1397"/>
             </a:lvl3pPr>
             <a:lvl4pPr>
-              <a:defRPr sz="1619"/>
+              <a:defRPr sz="1164"/>
             </a:lvl4pPr>
             <a:lvl5pPr>
-              <a:defRPr sz="1619"/>
+              <a:defRPr sz="1164"/>
             </a:lvl5pPr>
             <a:lvl6pPr>
-              <a:defRPr sz="1619"/>
+              <a:defRPr sz="1164"/>
             </a:lvl6pPr>
             <a:lvl7pPr>
-              <a:defRPr sz="1619"/>
+              <a:defRPr sz="1164"/>
             </a:lvl7pPr>
             <a:lvl8pPr>
-              <a:defRPr sz="1619"/>
+              <a:defRPr sz="1164"/>
             </a:lvl8pPr>
             <a:lvl9pPr>
-              <a:defRPr sz="1619"/>
+              <a:defRPr sz="1164"/>
             </a:lvl9pPr>
           </a:lstStyle>
           <a:p>
@@ -2169,8 +2169,8 @@
         </p:nvSpPr>
         <p:spPr>
           <a:xfrm>
-            <a:off x="763483" y="2544049"/>
-            <a:ext cx="5023581" cy="8315975"/>
+            <a:off x="513864" y="1441629"/>
+            <a:ext cx="3381110" cy="4712386"/>
           </a:xfrm>
         </p:spPr>
         <p:txBody>
@@ -2178,39 +2178,39 @@
           <a:lstStyle>
             <a:lvl1pPr marL="0" indent="0">
               <a:buNone/>
-              <a:defRPr sz="1132"/>
+              <a:defRPr sz="814"/>
             </a:lvl1pPr>
-            <a:lvl2pPr marL="369902" indent="0">
-              <a:buNone/>
-              <a:defRPr sz="970"/>
+            <a:lvl2pPr marL="265886" indent="0">
+              <a:buNone/>
+              <a:defRPr sz="697"/>
             </a:lvl2pPr>
-            <a:lvl3pPr marL="739808" indent="0">
-              <a:buNone/>
-              <a:defRPr sz="808"/>
+            <a:lvl3pPr marL="531774" indent="0">
+              <a:buNone/>
+              <a:defRPr sz="581"/>
             </a:lvl3pPr>
-            <a:lvl4pPr marL="1109709" indent="0">
-              <a:buNone/>
-              <a:defRPr sz="729"/>
+            <a:lvl4pPr marL="797659" indent="0">
+              <a:buNone/>
+              <a:defRPr sz="524"/>
             </a:lvl4pPr>
-            <a:lvl5pPr marL="1479613" indent="0">
-              <a:buNone/>
-              <a:defRPr sz="729"/>
+            <a:lvl5pPr marL="1063546" indent="0">
+              <a:buNone/>
+              <a:defRPr sz="524"/>
             </a:lvl5pPr>
-            <a:lvl6pPr marL="1849517" indent="0">
-              <a:buNone/>
-              <a:defRPr sz="729"/>
+            <a:lvl6pPr marL="1329433" indent="0">
+              <a:buNone/>
+              <a:defRPr sz="524"/>
             </a:lvl6pPr>
-            <a:lvl7pPr marL="2219419" indent="0">
-              <a:buNone/>
-              <a:defRPr sz="729"/>
+            <a:lvl7pPr marL="1595318" indent="0">
+              <a:buNone/>
+              <a:defRPr sz="524"/>
             </a:lvl7pPr>
-            <a:lvl8pPr marL="2589323" indent="0">
-              <a:buNone/>
-              <a:defRPr sz="729"/>
+            <a:lvl8pPr marL="1861205" indent="0">
+              <a:buNone/>
+              <a:defRPr sz="524"/>
             </a:lvl8pPr>
-            <a:lvl9pPr marL="2959226" indent="0">
-              <a:buNone/>
-              <a:defRPr sz="729"/>
+            <a:lvl9pPr marL="2127092" indent="0">
+              <a:buNone/>
+              <a:defRPr sz="524"/>
             </a:lvl9pPr>
           </a:lstStyle>
           <a:p>
@@ -2240,7 +2240,7 @@
             <a:fld id="{1D8BD707-D9CF-40AE-B4C6-C98DA3205C09}" type="datetimeFigureOut">
               <a:rPr lang="en-US" smtClean="0"/>
               <a:pPr/>
-              <a:t>6/5/2024</a:t>
+              <a:t>6/6/2024</a:t>
             </a:fld>
             <a:endParaRPr lang="en-US"/>
           </a:p>
@@ -2326,15 +2326,15 @@
         </p:nvSpPr>
         <p:spPr>
           <a:xfrm>
-            <a:off x="2992945" y="8510155"/>
-            <a:ext cx="9161738" cy="1004672"/>
+            <a:off x="2014396" y="4822422"/>
+            <a:ext cx="6166290" cy="569314"/>
           </a:xfrm>
         </p:spPr>
         <p:txBody>
           <a:bodyPr anchor="b"/>
           <a:lstStyle>
             <a:lvl1pPr algn="l">
-              <a:defRPr sz="1619" b="1"/>
+              <a:defRPr sz="1164" b="1"/>
             </a:lvl1pPr>
           </a:lstStyle>
           <a:p>
@@ -2357,8 +2357,8 @@
         </p:nvSpPr>
         <p:spPr>
           <a:xfrm>
-            <a:off x="2992945" y="1086283"/>
-            <a:ext cx="9161738" cy="7294418"/>
+            <a:off x="2014396" y="615564"/>
+            <a:ext cx="6166290" cy="4133503"/>
           </a:xfrm>
         </p:spPr>
         <p:txBody>
@@ -2366,39 +2366,39 @@
           <a:lstStyle>
             <a:lvl1pPr marL="0" indent="0">
               <a:buNone/>
-              <a:defRPr sz="2589"/>
+              <a:defRPr sz="1861"/>
             </a:lvl1pPr>
-            <a:lvl2pPr marL="369902" indent="0">
-              <a:buNone/>
-              <a:defRPr sz="2265"/>
+            <a:lvl2pPr marL="265886" indent="0">
+              <a:buNone/>
+              <a:defRPr sz="1628"/>
             </a:lvl2pPr>
-            <a:lvl3pPr marL="739808" indent="0">
-              <a:buNone/>
-              <a:defRPr sz="1943"/>
+            <a:lvl3pPr marL="531774" indent="0">
+              <a:buNone/>
+              <a:defRPr sz="1397"/>
             </a:lvl3pPr>
-            <a:lvl4pPr marL="1109709" indent="0">
-              <a:buNone/>
-              <a:defRPr sz="1619"/>
+            <a:lvl4pPr marL="797659" indent="0">
+              <a:buNone/>
+              <a:defRPr sz="1164"/>
             </a:lvl4pPr>
-            <a:lvl5pPr marL="1479613" indent="0">
-              <a:buNone/>
-              <a:defRPr sz="1619"/>
+            <a:lvl5pPr marL="1063546" indent="0">
+              <a:buNone/>
+              <a:defRPr sz="1164"/>
             </a:lvl5pPr>
-            <a:lvl6pPr marL="1849517" indent="0">
-              <a:buNone/>
-              <a:defRPr sz="1619"/>
+            <a:lvl6pPr marL="1329433" indent="0">
+              <a:buNone/>
+              <a:defRPr sz="1164"/>
             </a:lvl6pPr>
-            <a:lvl7pPr marL="2219419" indent="0">
-              <a:buNone/>
-              <a:defRPr sz="1619"/>
+            <a:lvl7pPr marL="1595318" indent="0">
+              <a:buNone/>
+              <a:defRPr sz="1164"/>
             </a:lvl7pPr>
-            <a:lvl8pPr marL="2589323" indent="0">
-              <a:buNone/>
-              <a:defRPr sz="1619"/>
+            <a:lvl8pPr marL="1861205" indent="0">
+              <a:buNone/>
+              <a:defRPr sz="1164"/>
             </a:lvl8pPr>
-            <a:lvl9pPr marL="2959226" indent="0">
-              <a:buNone/>
-              <a:defRPr sz="1619"/>
+            <a:lvl9pPr marL="2127092" indent="0">
+              <a:buNone/>
+              <a:defRPr sz="1164"/>
             </a:lvl9pPr>
           </a:lstStyle>
           <a:p>
@@ -2418,8 +2418,8 @@
         </p:nvSpPr>
         <p:spPr>
           <a:xfrm>
-            <a:off x="2992945" y="9514826"/>
-            <a:ext cx="9161738" cy="1426801"/>
+            <a:off x="2014396" y="5391740"/>
+            <a:ext cx="6166290" cy="808521"/>
           </a:xfrm>
         </p:spPr>
         <p:txBody>
@@ -2427,39 +2427,39 @@
           <a:lstStyle>
             <a:lvl1pPr marL="0" indent="0">
               <a:buNone/>
-              <a:defRPr sz="1132"/>
+              <a:defRPr sz="814"/>
             </a:lvl1pPr>
-            <a:lvl2pPr marL="369902" indent="0">
-              <a:buNone/>
-              <a:defRPr sz="970"/>
+            <a:lvl2pPr marL="265886" indent="0">
+              <a:buNone/>
+              <a:defRPr sz="697"/>
             </a:lvl2pPr>
-            <a:lvl3pPr marL="739808" indent="0">
-              <a:buNone/>
-              <a:defRPr sz="808"/>
+            <a:lvl3pPr marL="531774" indent="0">
+              <a:buNone/>
+              <a:defRPr sz="581"/>
             </a:lvl3pPr>
-            <a:lvl4pPr marL="1109709" indent="0">
-              <a:buNone/>
-              <a:defRPr sz="729"/>
+            <a:lvl4pPr marL="797659" indent="0">
+              <a:buNone/>
+              <a:defRPr sz="524"/>
             </a:lvl4pPr>
-            <a:lvl5pPr marL="1479613" indent="0">
-              <a:buNone/>
-              <a:defRPr sz="729"/>
+            <a:lvl5pPr marL="1063546" indent="0">
+              <a:buNone/>
+              <a:defRPr sz="524"/>
             </a:lvl5pPr>
-            <a:lvl6pPr marL="1849517" indent="0">
-              <a:buNone/>
-              <a:defRPr sz="729"/>
+            <a:lvl6pPr marL="1329433" indent="0">
+              <a:buNone/>
+              <a:defRPr sz="524"/>
             </a:lvl6pPr>
-            <a:lvl7pPr marL="2219419" indent="0">
-              <a:buNone/>
-              <a:defRPr sz="729"/>
+            <a:lvl7pPr marL="1595318" indent="0">
+              <a:buNone/>
+              <a:defRPr sz="524"/>
             </a:lvl7pPr>
-            <a:lvl8pPr marL="2589323" indent="0">
-              <a:buNone/>
-              <a:defRPr sz="729"/>
+            <a:lvl8pPr marL="1861205" indent="0">
+              <a:buNone/>
+              <a:defRPr sz="524"/>
             </a:lvl8pPr>
-            <a:lvl9pPr marL="2959226" indent="0">
-              <a:buNone/>
-              <a:defRPr sz="729"/>
+            <a:lvl9pPr marL="2127092" indent="0">
+              <a:buNone/>
+              <a:defRPr sz="524"/>
             </a:lvl9pPr>
           </a:lstStyle>
           <a:p>
@@ -2489,7 +2489,7 @@
             <a:fld id="{1D8BD707-D9CF-40AE-B4C6-C98DA3205C09}" type="datetimeFigureOut">
               <a:rPr lang="en-US" smtClean="0"/>
               <a:pPr/>
-              <a:t>6/5/2024</a:t>
+              <a:t>6/6/2024</a:t>
             </a:fld>
             <a:endParaRPr lang="en-US"/>
           </a:p>
@@ -2580,8 +2580,8 @@
         </p:nvSpPr>
         <p:spPr>
           <a:xfrm>
-            <a:off x="763483" y="486858"/>
-            <a:ext cx="13742605" cy="2026227"/>
+            <a:off x="513863" y="275892"/>
+            <a:ext cx="9249432" cy="1148195"/>
           </a:xfrm>
           <a:prstGeom prst="rect">
             <a:avLst/>
@@ -2612,8 +2612,8 @@
         </p:nvSpPr>
         <p:spPr>
           <a:xfrm>
-            <a:off x="763483" y="2836726"/>
-            <a:ext cx="13742605" cy="8023298"/>
+            <a:off x="513863" y="1607478"/>
+            <a:ext cx="9249432" cy="4546536"/>
           </a:xfrm>
           <a:prstGeom prst="rect">
             <a:avLst/>
@@ -2673,8 +2673,8 @@
         </p:nvSpPr>
         <p:spPr>
           <a:xfrm>
-            <a:off x="763480" y="11268081"/>
-            <a:ext cx="3562897" cy="647267"/>
+            <a:off x="513859" y="6385250"/>
+            <a:ext cx="2398001" cy="366785"/>
           </a:xfrm>
           <a:prstGeom prst="rect">
             <a:avLst/>
@@ -2684,7 +2684,7 @@
           <a:bodyPr vert="horz" lIns="91440" tIns="45720" rIns="91440" bIns="45720" rtlCol="0" anchor="ctr"/>
           <a:lstStyle>
             <a:lvl1pPr algn="l">
-              <a:defRPr sz="970">
+              <a:defRPr sz="697">
                 <a:solidFill>
                   <a:schemeClr val="tx1">
                     <a:tint val="75000"/>
@@ -2697,7 +2697,7 @@
             <a:fld id="{1D8BD707-D9CF-40AE-B4C6-C98DA3205C09}" type="datetimeFigureOut">
               <a:rPr lang="en-US" smtClean="0"/>
               <a:pPr/>
-              <a:t>6/5/2024</a:t>
+              <a:t>6/6/2024</a:t>
             </a:fld>
             <a:endParaRPr lang="en-US"/>
           </a:p>
@@ -2715,8 +2715,8 @@
         </p:nvSpPr>
         <p:spPr>
           <a:xfrm>
-            <a:off x="5217107" y="11268081"/>
-            <a:ext cx="4835362" cy="647267"/>
+            <a:off x="3511366" y="6385250"/>
+            <a:ext cx="3254431" cy="366785"/>
           </a:xfrm>
           <a:prstGeom prst="rect">
             <a:avLst/>
@@ -2726,7 +2726,7 @@
           <a:bodyPr vert="horz" lIns="91440" tIns="45720" rIns="91440" bIns="45720" rtlCol="0" anchor="ctr"/>
           <a:lstStyle>
             <a:lvl1pPr algn="ctr">
-              <a:defRPr sz="970">
+              <a:defRPr sz="697">
                 <a:solidFill>
                   <a:schemeClr val="tx1">
                     <a:tint val="75000"/>
@@ -2752,8 +2752,8 @@
         </p:nvSpPr>
         <p:spPr>
           <a:xfrm>
-            <a:off x="10943190" y="11268081"/>
-            <a:ext cx="3562897" cy="647267"/>
+            <a:off x="7365293" y="6385250"/>
+            <a:ext cx="2398001" cy="366785"/>
           </a:xfrm>
           <a:prstGeom prst="rect">
             <a:avLst/>
@@ -2763,7 +2763,7 @@
           <a:bodyPr vert="horz" lIns="91440" tIns="45720" rIns="91440" bIns="45720" rtlCol="0" anchor="ctr"/>
           <a:lstStyle>
             <a:lvl1pPr algn="r">
-              <a:defRPr sz="970">
+              <a:defRPr sz="697">
                 <a:solidFill>
                   <a:schemeClr val="tx1">
                     <a:tint val="75000"/>
@@ -2800,12 +2800,12 @@
   </p:sldLayoutIdLst>
   <p:txStyles>
     <p:titleStyle>
-      <a:lvl1pPr algn="ctr" defTabSz="739808" rtl="0" eaLnBrk="1" latinLnBrk="0" hangingPunct="1">
+      <a:lvl1pPr algn="ctr" defTabSz="531774" rtl="0" eaLnBrk="1" latinLnBrk="0" hangingPunct="1">
         <a:spcBef>
           <a:spcPct val="0"/>
         </a:spcBef>
         <a:buNone/>
-        <a:defRPr sz="3559" kern="1200">
+        <a:defRPr sz="2558" kern="1200">
           <a:solidFill>
             <a:schemeClr val="tx1"/>
           </a:solidFill>
@@ -2816,13 +2816,13 @@
       </a:lvl1pPr>
     </p:titleStyle>
     <p:bodyStyle>
-      <a:lvl1pPr marL="277427" indent="-277427" algn="l" defTabSz="739808" rtl="0" eaLnBrk="1" latinLnBrk="0" hangingPunct="1">
+      <a:lvl1pPr marL="199415" indent="-199415" algn="l" defTabSz="531774" rtl="0" eaLnBrk="1" latinLnBrk="0" hangingPunct="1">
         <a:spcBef>
           <a:spcPct val="20000"/>
         </a:spcBef>
         <a:buFont typeface="Arial" pitchFamily="34" charset="0"/>
         <a:buChar char="•"/>
-        <a:defRPr sz="2589" kern="1200">
+        <a:defRPr sz="1861" kern="1200">
           <a:solidFill>
             <a:schemeClr val="tx1"/>
           </a:solidFill>
@@ -2831,13 +2831,13 @@
           <a:cs typeface="+mn-cs"/>
         </a:defRPr>
       </a:lvl1pPr>
-      <a:lvl2pPr marL="601092" indent="-231190" algn="l" defTabSz="739808" rtl="0" eaLnBrk="1" latinLnBrk="0" hangingPunct="1">
+      <a:lvl2pPr marL="432065" indent="-166179" algn="l" defTabSz="531774" rtl="0" eaLnBrk="1" latinLnBrk="0" hangingPunct="1">
         <a:spcBef>
           <a:spcPct val="20000"/>
         </a:spcBef>
         <a:buFont typeface="Arial" pitchFamily="34" charset="0"/>
         <a:buChar char="–"/>
-        <a:defRPr sz="2265" kern="1200">
+        <a:defRPr sz="1628" kern="1200">
           <a:solidFill>
             <a:schemeClr val="tx1"/>
           </a:solidFill>
@@ -2846,13 +2846,13 @@
           <a:cs typeface="+mn-cs"/>
         </a:defRPr>
       </a:lvl2pPr>
-      <a:lvl3pPr marL="924758" indent="-184952" algn="l" defTabSz="739808" rtl="0" eaLnBrk="1" latinLnBrk="0" hangingPunct="1">
+      <a:lvl3pPr marL="664716" indent="-132943" algn="l" defTabSz="531774" rtl="0" eaLnBrk="1" latinLnBrk="0" hangingPunct="1">
         <a:spcBef>
           <a:spcPct val="20000"/>
         </a:spcBef>
         <a:buFont typeface="Arial" pitchFamily="34" charset="0"/>
         <a:buChar char="•"/>
-        <a:defRPr sz="1943" kern="1200">
+        <a:defRPr sz="1397" kern="1200">
           <a:solidFill>
             <a:schemeClr val="tx1"/>
           </a:solidFill>
@@ -2861,13 +2861,13 @@
           <a:cs typeface="+mn-cs"/>
         </a:defRPr>
       </a:lvl3pPr>
-      <a:lvl4pPr marL="1294661" indent="-184952" algn="l" defTabSz="739808" rtl="0" eaLnBrk="1" latinLnBrk="0" hangingPunct="1">
+      <a:lvl4pPr marL="930602" indent="-132943" algn="l" defTabSz="531774" rtl="0" eaLnBrk="1" latinLnBrk="0" hangingPunct="1">
         <a:spcBef>
           <a:spcPct val="20000"/>
         </a:spcBef>
         <a:buFont typeface="Arial" pitchFamily="34" charset="0"/>
         <a:buChar char="–"/>
-        <a:defRPr sz="1619" kern="1200">
+        <a:defRPr sz="1164" kern="1200">
           <a:solidFill>
             <a:schemeClr val="tx1"/>
           </a:solidFill>
@@ -2876,13 +2876,13 @@
           <a:cs typeface="+mn-cs"/>
         </a:defRPr>
       </a:lvl4pPr>
-      <a:lvl5pPr marL="1664565" indent="-184952" algn="l" defTabSz="739808" rtl="0" eaLnBrk="1" latinLnBrk="0" hangingPunct="1">
+      <a:lvl5pPr marL="1196489" indent="-132943" algn="l" defTabSz="531774" rtl="0" eaLnBrk="1" latinLnBrk="0" hangingPunct="1">
         <a:spcBef>
           <a:spcPct val="20000"/>
         </a:spcBef>
         <a:buFont typeface="Arial" pitchFamily="34" charset="0"/>
         <a:buChar char="»"/>
-        <a:defRPr sz="1619" kern="1200">
+        <a:defRPr sz="1164" kern="1200">
           <a:solidFill>
             <a:schemeClr val="tx1"/>
           </a:solidFill>
@@ -2891,13 +2891,13 @@
           <a:cs typeface="+mn-cs"/>
         </a:defRPr>
       </a:lvl5pPr>
-      <a:lvl6pPr marL="2034467" indent="-184952" algn="l" defTabSz="739808" rtl="0" eaLnBrk="1" latinLnBrk="0" hangingPunct="1">
+      <a:lvl6pPr marL="1462375" indent="-132943" algn="l" defTabSz="531774" rtl="0" eaLnBrk="1" latinLnBrk="0" hangingPunct="1">
         <a:spcBef>
           <a:spcPct val="20000"/>
         </a:spcBef>
         <a:buFont typeface="Arial" pitchFamily="34" charset="0"/>
         <a:buChar char="•"/>
-        <a:defRPr sz="1619" kern="1200">
+        <a:defRPr sz="1164" kern="1200">
           <a:solidFill>
             <a:schemeClr val="tx1"/>
           </a:solidFill>
@@ -2906,13 +2906,13 @@
           <a:cs typeface="+mn-cs"/>
         </a:defRPr>
       </a:lvl6pPr>
-      <a:lvl7pPr marL="2404371" indent="-184952" algn="l" defTabSz="739808" rtl="0" eaLnBrk="1" latinLnBrk="0" hangingPunct="1">
+      <a:lvl7pPr marL="1728262" indent="-132943" algn="l" defTabSz="531774" rtl="0" eaLnBrk="1" latinLnBrk="0" hangingPunct="1">
         <a:spcBef>
           <a:spcPct val="20000"/>
         </a:spcBef>
         <a:buFont typeface="Arial" pitchFamily="34" charset="0"/>
         <a:buChar char="•"/>
-        <a:defRPr sz="1619" kern="1200">
+        <a:defRPr sz="1164" kern="1200">
           <a:solidFill>
             <a:schemeClr val="tx1"/>
           </a:solidFill>
@@ -2921,13 +2921,13 @@
           <a:cs typeface="+mn-cs"/>
         </a:defRPr>
       </a:lvl7pPr>
-      <a:lvl8pPr marL="2774275" indent="-184952" algn="l" defTabSz="739808" rtl="0" eaLnBrk="1" latinLnBrk="0" hangingPunct="1">
+      <a:lvl8pPr marL="1994149" indent="-132943" algn="l" defTabSz="531774" rtl="0" eaLnBrk="1" latinLnBrk="0" hangingPunct="1">
         <a:spcBef>
           <a:spcPct val="20000"/>
         </a:spcBef>
         <a:buFont typeface="Arial" pitchFamily="34" charset="0"/>
         <a:buChar char="•"/>
-        <a:defRPr sz="1619" kern="1200">
+        <a:defRPr sz="1164" kern="1200">
           <a:solidFill>
             <a:schemeClr val="tx1"/>
           </a:solidFill>
@@ -2936,13 +2936,13 @@
           <a:cs typeface="+mn-cs"/>
         </a:defRPr>
       </a:lvl8pPr>
-      <a:lvl9pPr marL="3144178" indent="-184952" algn="l" defTabSz="739808" rtl="0" eaLnBrk="1" latinLnBrk="0" hangingPunct="1">
+      <a:lvl9pPr marL="2260035" indent="-132943" algn="l" defTabSz="531774" rtl="0" eaLnBrk="1" latinLnBrk="0" hangingPunct="1">
         <a:spcBef>
           <a:spcPct val="20000"/>
         </a:spcBef>
         <a:buFont typeface="Arial" pitchFamily="34" charset="0"/>
         <a:buChar char="•"/>
-        <a:defRPr sz="1619" kern="1200">
+        <a:defRPr sz="1164" kern="1200">
           <a:solidFill>
             <a:schemeClr val="tx1"/>
           </a:solidFill>
@@ -2956,8 +2956,8 @@
       <a:defPPr>
         <a:defRPr lang="en-US"/>
       </a:defPPr>
-      <a:lvl1pPr marL="0" algn="l" defTabSz="739808" rtl="0" eaLnBrk="1" latinLnBrk="0" hangingPunct="1">
-        <a:defRPr sz="1457" kern="1200">
+      <a:lvl1pPr marL="0" algn="l" defTabSz="531774" rtl="0" eaLnBrk="1" latinLnBrk="0" hangingPunct="1">
+        <a:defRPr sz="1047" kern="1200">
           <a:solidFill>
             <a:schemeClr val="tx1"/>
           </a:solidFill>
@@ -2966,8 +2966,8 @@
           <a:cs typeface="+mn-cs"/>
         </a:defRPr>
       </a:lvl1pPr>
-      <a:lvl2pPr marL="369902" algn="l" defTabSz="739808" rtl="0" eaLnBrk="1" latinLnBrk="0" hangingPunct="1">
-        <a:defRPr sz="1457" kern="1200">
+      <a:lvl2pPr marL="265886" algn="l" defTabSz="531774" rtl="0" eaLnBrk="1" latinLnBrk="0" hangingPunct="1">
+        <a:defRPr sz="1047" kern="1200">
           <a:solidFill>
             <a:schemeClr val="tx1"/>
           </a:solidFill>
@@ -2976,8 +2976,8 @@
           <a:cs typeface="+mn-cs"/>
         </a:defRPr>
       </a:lvl2pPr>
-      <a:lvl3pPr marL="739808" algn="l" defTabSz="739808" rtl="0" eaLnBrk="1" latinLnBrk="0" hangingPunct="1">
-        <a:defRPr sz="1457" kern="1200">
+      <a:lvl3pPr marL="531774" algn="l" defTabSz="531774" rtl="0" eaLnBrk="1" latinLnBrk="0" hangingPunct="1">
+        <a:defRPr sz="1047" kern="1200">
           <a:solidFill>
             <a:schemeClr val="tx1"/>
           </a:solidFill>
@@ -2986,8 +2986,8 @@
           <a:cs typeface="+mn-cs"/>
         </a:defRPr>
       </a:lvl3pPr>
-      <a:lvl4pPr marL="1109709" algn="l" defTabSz="739808" rtl="0" eaLnBrk="1" latinLnBrk="0" hangingPunct="1">
-        <a:defRPr sz="1457" kern="1200">
+      <a:lvl4pPr marL="797659" algn="l" defTabSz="531774" rtl="0" eaLnBrk="1" latinLnBrk="0" hangingPunct="1">
+        <a:defRPr sz="1047" kern="1200">
           <a:solidFill>
             <a:schemeClr val="tx1"/>
           </a:solidFill>
@@ -2996,8 +2996,8 @@
           <a:cs typeface="+mn-cs"/>
         </a:defRPr>
       </a:lvl4pPr>
-      <a:lvl5pPr marL="1479613" algn="l" defTabSz="739808" rtl="0" eaLnBrk="1" latinLnBrk="0" hangingPunct="1">
-        <a:defRPr sz="1457" kern="1200">
+      <a:lvl5pPr marL="1063546" algn="l" defTabSz="531774" rtl="0" eaLnBrk="1" latinLnBrk="0" hangingPunct="1">
+        <a:defRPr sz="1047" kern="1200">
           <a:solidFill>
             <a:schemeClr val="tx1"/>
           </a:solidFill>
@@ -3006,8 +3006,8 @@
           <a:cs typeface="+mn-cs"/>
         </a:defRPr>
       </a:lvl5pPr>
-      <a:lvl6pPr marL="1849517" algn="l" defTabSz="739808" rtl="0" eaLnBrk="1" latinLnBrk="0" hangingPunct="1">
-        <a:defRPr sz="1457" kern="1200">
+      <a:lvl6pPr marL="1329433" algn="l" defTabSz="531774" rtl="0" eaLnBrk="1" latinLnBrk="0" hangingPunct="1">
+        <a:defRPr sz="1047" kern="1200">
           <a:solidFill>
             <a:schemeClr val="tx1"/>
           </a:solidFill>
@@ -3016,8 +3016,8 @@
           <a:cs typeface="+mn-cs"/>
         </a:defRPr>
       </a:lvl6pPr>
-      <a:lvl7pPr marL="2219419" algn="l" defTabSz="739808" rtl="0" eaLnBrk="1" latinLnBrk="0" hangingPunct="1">
-        <a:defRPr sz="1457" kern="1200">
+      <a:lvl7pPr marL="1595318" algn="l" defTabSz="531774" rtl="0" eaLnBrk="1" latinLnBrk="0" hangingPunct="1">
+        <a:defRPr sz="1047" kern="1200">
           <a:solidFill>
             <a:schemeClr val="tx1"/>
           </a:solidFill>
@@ -3026,8 +3026,8 @@
           <a:cs typeface="+mn-cs"/>
         </a:defRPr>
       </a:lvl7pPr>
-      <a:lvl8pPr marL="2589323" algn="l" defTabSz="739808" rtl="0" eaLnBrk="1" latinLnBrk="0" hangingPunct="1">
-        <a:defRPr sz="1457" kern="1200">
+      <a:lvl8pPr marL="1861205" algn="l" defTabSz="531774" rtl="0" eaLnBrk="1" latinLnBrk="0" hangingPunct="1">
+        <a:defRPr sz="1047" kern="1200">
           <a:solidFill>
             <a:schemeClr val="tx1"/>
           </a:solidFill>
@@ -3036,8 +3036,8 @@
           <a:cs typeface="+mn-cs"/>
         </a:defRPr>
       </a:lvl8pPr>
-      <a:lvl9pPr marL="2959226" algn="l" defTabSz="739808" rtl="0" eaLnBrk="1" latinLnBrk="0" hangingPunct="1">
-        <a:defRPr sz="1457" kern="1200">
+      <a:lvl9pPr marL="2127092" algn="l" defTabSz="531774" rtl="0" eaLnBrk="1" latinLnBrk="0" hangingPunct="1">
+        <a:defRPr sz="1047" kern="1200">
           <a:solidFill>
             <a:schemeClr val="tx1"/>
           </a:solidFill>
@@ -3076,8 +3076,8 @@
         </p:nvSpPr>
         <p:spPr>
           <a:xfrm>
-            <a:off x="2185459" y="182483"/>
-            <a:ext cx="7003" cy="1954800"/>
+            <a:off x="1388762" y="34494"/>
+            <a:ext cx="5034" cy="1296000"/>
           </a:xfrm>
           <a:custGeom>
             <a:avLst/>
@@ -3117,7 +3117,7 @@
           <a:bodyPr/>
           <a:lstStyle/>
           <a:p>
-            <a:endParaRPr sz="1457"/>
+            <a:endParaRPr sz="1047"/>
           </a:p>
         </p:txBody>
       </p:sp>
@@ -3135,8 +3135,8 @@
         </p:nvGrpSpPr>
         <p:grpSpPr>
           <a:xfrm>
-            <a:off x="3529850" y="-9828"/>
-            <a:ext cx="3850438" cy="486078"/>
+            <a:off x="2397977" y="-5506"/>
+            <a:ext cx="2564277" cy="182634"/>
             <a:chOff x="3529850" y="-4914"/>
             <a:chExt cx="3850438" cy="486078"/>
           </a:xfrm>
@@ -3196,7 +3196,7 @@
             <a:bodyPr/>
             <a:lstStyle/>
             <a:p>
-              <a:endParaRPr sz="1457"/>
+              <a:endParaRPr sz="1047"/>
             </a:p>
           </p:txBody>
         </p:sp>
@@ -3249,7 +3249,7 @@
             <a:bodyPr/>
             <a:lstStyle/>
             <a:p>
-              <a:endParaRPr sz="1457"/>
+              <a:endParaRPr sz="1047"/>
             </a:p>
           </p:txBody>
         </p:sp>
@@ -3262,8 +3262,8 @@
         </p:nvSpPr>
         <p:spPr>
           <a:xfrm>
-            <a:off x="-3862" y="762291"/>
-            <a:ext cx="2189786" cy="719446"/>
+            <a:off x="16218" y="488690"/>
+            <a:ext cx="1321908" cy="415545"/>
           </a:xfrm>
           <a:custGeom>
             <a:avLst/>
@@ -3303,126 +3303,244 @@
           <a:bodyPr/>
           <a:lstStyle/>
           <a:p>
-            <a:endParaRPr sz="1457"/>
-          </a:p>
-        </p:txBody>
-      </p:sp>
-      <p:sp>
-        <p:nvSpPr>
-          <p:cNvPr id="6" name="Freeform 6"/>
-          <p:cNvSpPr/>
+            <a:endParaRPr sz="1047"/>
+          </a:p>
+        </p:txBody>
+      </p:sp>
+      <p:grpSp>
+        <p:nvGrpSpPr>
+          <p:cNvPr id="17" name="Agrupar 16">
+            <a:extLst>
+              <a:ext uri="{FF2B5EF4-FFF2-40B4-BE49-F238E27FC236}">
+                <a16:creationId xmlns:a16="http://schemas.microsoft.com/office/drawing/2014/main" id="{ED6F6509-961E-1B0D-1646-ED5F21FDC5AC}"/>
+              </a:ext>
+            </a:extLst>
+          </p:cNvPr>
+          <p:cNvGrpSpPr/>
+          <p:nvPr/>
+        </p:nvGrpSpPr>
+        <p:grpSpPr>
+          <a:xfrm>
+            <a:off x="2024981" y="1066894"/>
+            <a:ext cx="1103715" cy="181141"/>
+            <a:chOff x="2191703" y="1045081"/>
+            <a:chExt cx="1200766" cy="181141"/>
+          </a:xfrm>
+        </p:grpSpPr>
+        <p:sp>
+          <p:nvSpPr>
+            <p:cNvPr id="6" name="Freeform 6"/>
+            <p:cNvSpPr/>
+            <p:nvPr/>
+          </p:nvSpPr>
+          <p:spPr>
+            <a:xfrm>
+              <a:off x="2191703" y="1045081"/>
+              <a:ext cx="181141" cy="181141"/>
+            </a:xfrm>
+            <a:custGeom>
+              <a:avLst/>
+              <a:gdLst/>
+              <a:ahLst/>
+              <a:cxnLst/>
+              <a:rect l="l" t="t" r="r" b="b"/>
+              <a:pathLst>
+                <a:path w="106499" h="106499">
+                  <a:moveTo>
+                    <a:pt x="0" y="0"/>
+                  </a:moveTo>
+                  <a:lnTo>
+                    <a:pt x="106499" y="0"/>
+                  </a:lnTo>
+                  <a:lnTo>
+                    <a:pt x="106499" y="106499"/>
+                  </a:lnTo>
+                  <a:lnTo>
+                    <a:pt x="0" y="106499"/>
+                  </a:lnTo>
+                  <a:lnTo>
+                    <a:pt x="0" y="0"/>
+                  </a:lnTo>
+                  <a:close/>
+                </a:path>
+              </a:pathLst>
+            </a:custGeom>
+            <a:blipFill>
+              <a:blip r:embed="rId4"/>
+              <a:stretch>
+                <a:fillRect/>
+              </a:stretch>
+            </a:blipFill>
+          </p:spPr>
+          <p:txBody>
+            <a:bodyPr/>
+            <a:lstStyle/>
+            <a:p>
+              <a:endParaRPr sz="1047"/>
+            </a:p>
+          </p:txBody>
+        </p:sp>
+        <p:sp>
+          <p:nvSpPr>
+            <p:cNvPr id="11" name="TextBox 11"/>
+            <p:cNvSpPr txBox="1"/>
+            <p:nvPr/>
+          </p:nvSpPr>
+          <p:spPr>
+            <a:xfrm>
+              <a:off x="2233781" y="1135655"/>
+              <a:ext cx="1158688" cy="56362"/>
+            </a:xfrm>
+            <a:prstGeom prst="rect">
+              <a:avLst/>
+            </a:prstGeom>
+          </p:spPr>
+          <p:txBody>
+            <a:bodyPr wrap="square" lIns="0" tIns="0" rIns="0" bIns="0" rtlCol="0" anchor="t">
+              <a:spAutoFit/>
+            </a:bodyPr>
+            <a:lstStyle/>
+            <a:p>
+              <a:pPr algn="ctr">
+                <a:lnSpc>
+                  <a:spcPts val="443"/>
+                </a:lnSpc>
+              </a:pPr>
+              <a:r>
+                <a:rPr lang="en-US" sz="719" spc="-3" dirty="0">
+                  <a:solidFill>
+                    <a:srgbClr val="000000"/>
+                  </a:solidFill>
+                  <a:latin typeface="Montserrat Classic"/>
+                </a:rPr>
+                <a:t>@SCHWARZ-SA</a:t>
+              </a:r>
+            </a:p>
+          </p:txBody>
+        </p:sp>
+      </p:grpSp>
+      <p:grpSp>
+        <p:nvGrpSpPr>
+          <p:cNvPr id="19" name="Agrupar 18">
+            <a:extLst>
+              <a:ext uri="{FF2B5EF4-FFF2-40B4-BE49-F238E27FC236}">
+                <a16:creationId xmlns:a16="http://schemas.microsoft.com/office/drawing/2014/main" id="{5EF80789-787C-E01F-0EBD-086844CF60F8}"/>
+              </a:ext>
+            </a:extLst>
+          </p:cNvPr>
+          <p:cNvGrpSpPr/>
+          <p:nvPr/>
+        </p:nvGrpSpPr>
+        <p:grpSpPr>
+          <a:xfrm>
+            <a:off x="3041526" y="1074278"/>
+            <a:ext cx="875765" cy="151944"/>
+            <a:chOff x="3162556" y="1046587"/>
+            <a:chExt cx="972539" cy="181141"/>
+          </a:xfrm>
+        </p:grpSpPr>
+        <p:sp>
+          <p:nvSpPr>
+            <p:cNvPr id="7" name="Freeform 7"/>
+            <p:cNvSpPr/>
+            <p:nvPr/>
+          </p:nvSpPr>
+          <p:spPr>
+            <a:xfrm>
+              <a:off x="3162556" y="1046587"/>
+              <a:ext cx="181141" cy="181141"/>
+            </a:xfrm>
+            <a:custGeom>
+              <a:avLst/>
+              <a:gdLst/>
+              <a:ahLst/>
+              <a:cxnLst/>
+              <a:rect l="l" t="t" r="r" b="b"/>
+              <a:pathLst>
+                <a:path w="103082" h="103082">
+                  <a:moveTo>
+                    <a:pt x="0" y="0"/>
+                  </a:moveTo>
+                  <a:lnTo>
+                    <a:pt x="103083" y="0"/>
+                  </a:lnTo>
+                  <a:lnTo>
+                    <a:pt x="103083" y="103082"/>
+                  </a:lnTo>
+                  <a:lnTo>
+                    <a:pt x="0" y="103082"/>
+                  </a:lnTo>
+                  <a:lnTo>
+                    <a:pt x="0" y="0"/>
+                  </a:lnTo>
+                  <a:close/>
+                </a:path>
+              </a:pathLst>
+            </a:custGeom>
+            <a:blipFill>
+              <a:blip r:embed="rId5"/>
+              <a:stretch>
+                <a:fillRect/>
+              </a:stretch>
+            </a:blipFill>
+          </p:spPr>
+          <p:txBody>
+            <a:bodyPr/>
+            <a:lstStyle/>
+            <a:p>
+              <a:endParaRPr sz="1047"/>
+            </a:p>
+          </p:txBody>
+        </p:sp>
+        <p:sp>
+          <p:nvSpPr>
+            <p:cNvPr id="12" name="TextBox 12"/>
+            <p:cNvSpPr txBox="1"/>
+            <p:nvPr/>
+          </p:nvSpPr>
+          <p:spPr>
+            <a:xfrm>
+              <a:off x="3384527" y="1132792"/>
+              <a:ext cx="750568" cy="67192"/>
+            </a:xfrm>
+            <a:prstGeom prst="rect">
+              <a:avLst/>
+            </a:prstGeom>
+          </p:spPr>
+          <p:txBody>
+            <a:bodyPr wrap="square" lIns="0" tIns="0" rIns="0" bIns="0" rtlCol="0" anchor="t">
+              <a:spAutoFit/>
+            </a:bodyPr>
+            <a:lstStyle/>
+            <a:p>
+              <a:pPr>
+                <a:lnSpc>
+                  <a:spcPts val="443"/>
+                </a:lnSpc>
+              </a:pPr>
+              <a:r>
+                <a:rPr lang="en-US" sz="719" spc="-3" dirty="0">
+                  <a:solidFill>
+                    <a:srgbClr val="000000"/>
+                  </a:solidFill>
+                  <a:latin typeface="Montserrat Classic"/>
+                </a:rPr>
+                <a:t>/SCHWARZ.SA</a:t>
+              </a:r>
+            </a:p>
+          </p:txBody>
+        </p:sp>
+      </p:grpSp>
+      <p:sp>
+        <p:nvSpPr>
+          <p:cNvPr id="13" name="TextBox 13"/>
+          <p:cNvSpPr txBox="1"/>
           <p:nvPr/>
         </p:nvSpPr>
         <p:spPr>
           <a:xfrm>
-            <a:off x="3007934" y="1715983"/>
-            <a:ext cx="252000" cy="252000"/>
-          </a:xfrm>
-          <a:custGeom>
-            <a:avLst/>
-            <a:gdLst/>
-            <a:ahLst/>
-            <a:cxnLst/>
-            <a:rect l="l" t="t" r="r" b="b"/>
-            <a:pathLst>
-              <a:path w="106499" h="106499">
-                <a:moveTo>
-                  <a:pt x="0" y="0"/>
-                </a:moveTo>
-                <a:lnTo>
-                  <a:pt x="106499" y="0"/>
-                </a:lnTo>
-                <a:lnTo>
-                  <a:pt x="106499" y="106499"/>
-                </a:lnTo>
-                <a:lnTo>
-                  <a:pt x="0" y="106499"/>
-                </a:lnTo>
-                <a:lnTo>
-                  <a:pt x="0" y="0"/>
-                </a:lnTo>
-                <a:close/>
-              </a:path>
-            </a:pathLst>
-          </a:custGeom>
-          <a:blipFill>
-            <a:blip r:embed="rId4"/>
-            <a:stretch>
-              <a:fillRect/>
-            </a:stretch>
-          </a:blipFill>
-        </p:spPr>
-        <p:txBody>
-          <a:bodyPr/>
-          <a:lstStyle/>
-          <a:p>
-            <a:endParaRPr sz="1457"/>
-          </a:p>
-        </p:txBody>
-      </p:sp>
-      <p:sp>
-        <p:nvSpPr>
-          <p:cNvPr id="7" name="Freeform 7"/>
-          <p:cNvSpPr/>
-          <p:nvPr/>
-        </p:nvSpPr>
-        <p:spPr>
-          <a:xfrm>
-            <a:off x="4358565" y="1718078"/>
-            <a:ext cx="252000" cy="252000"/>
-          </a:xfrm>
-          <a:custGeom>
-            <a:avLst/>
-            <a:gdLst/>
-            <a:ahLst/>
-            <a:cxnLst/>
-            <a:rect l="l" t="t" r="r" b="b"/>
-            <a:pathLst>
-              <a:path w="103082" h="103082">
-                <a:moveTo>
-                  <a:pt x="0" y="0"/>
-                </a:moveTo>
-                <a:lnTo>
-                  <a:pt x="103083" y="0"/>
-                </a:lnTo>
-                <a:lnTo>
-                  <a:pt x="103083" y="103082"/>
-                </a:lnTo>
-                <a:lnTo>
-                  <a:pt x="0" y="103082"/>
-                </a:lnTo>
-                <a:lnTo>
-                  <a:pt x="0" y="0"/>
-                </a:lnTo>
-                <a:close/>
-              </a:path>
-            </a:pathLst>
-          </a:custGeom>
-          <a:blipFill>
-            <a:blip r:embed="rId5"/>
-            <a:stretch>
-              <a:fillRect/>
-            </a:stretch>
-          </a:blipFill>
-        </p:spPr>
-        <p:txBody>
-          <a:bodyPr/>
-          <a:lstStyle/>
-          <a:p>
-            <a:endParaRPr sz="1457"/>
-          </a:p>
-        </p:txBody>
-      </p:sp>
-      <p:sp>
-        <p:nvSpPr>
-          <p:cNvPr id="10" name="TextBox 10"/>
-          <p:cNvSpPr txBox="1"/>
-          <p:nvPr/>
-        </p:nvSpPr>
-        <p:spPr>
-          <a:xfrm>
-            <a:off x="3328226" y="1378231"/>
-            <a:ext cx="1652340" cy="177934"/>
+            <a:off x="1439753" y="244475"/>
+            <a:ext cx="2483048" cy="234218"/>
           </a:xfrm>
           <a:prstGeom prst="rect">
             <a:avLst/>
@@ -3430,146 +3548,17 @@
         </p:spPr>
         <p:txBody>
           <a:bodyPr wrap="square" lIns="0" tIns="0" rIns="0" bIns="0" rtlCol="0" anchor="t">
-            <a:spAutoFit/>
+            <a:normAutofit/>
           </a:bodyPr>
           <a:lstStyle/>
           <a:p>
             <a:pPr>
               <a:lnSpc>
-                <a:spcPts val="1256"/>
+                <a:spcPts val="1228"/>
               </a:lnSpc>
             </a:pPr>
             <a:r>
-              <a:rPr lang="en-US" sz="1800" dirty="0">
-                <a:solidFill>
-                  <a:srgbClr val="000000"/>
-                </a:solidFill>
-                <a:latin typeface="Pathway Gothic One"/>
-              </a:rPr>
-              <a:t>+55 (41</a:t>
-            </a:r>
-            <a:r>
-              <a:rPr lang="en-US" sz="1800">
-                <a:solidFill>
-                  <a:srgbClr val="000000"/>
-                </a:solidFill>
-                <a:latin typeface="Pathway Gothic One"/>
-              </a:rPr>
-              <a:t>) 2106-RAMAL</a:t>
-            </a:r>
-            <a:endParaRPr lang="en-US" sz="1800" dirty="0">
-              <a:solidFill>
-                <a:srgbClr val="000000"/>
-              </a:solidFill>
-              <a:latin typeface="Pathway Gothic One"/>
-            </a:endParaRPr>
-          </a:p>
-        </p:txBody>
-      </p:sp>
-      <p:sp>
-        <p:nvSpPr>
-          <p:cNvPr id="11" name="TextBox 11"/>
-          <p:cNvSpPr txBox="1"/>
-          <p:nvPr/>
-        </p:nvSpPr>
-        <p:spPr>
-          <a:xfrm>
-            <a:off x="2984592" y="1836434"/>
-            <a:ext cx="1611943" cy="83805"/>
-          </a:xfrm>
-          <a:prstGeom prst="rect">
-            <a:avLst/>
-          </a:prstGeom>
-        </p:spPr>
-        <p:txBody>
-          <a:bodyPr wrap="square" lIns="0" tIns="0" rIns="0" bIns="0" rtlCol="0" anchor="t">
-            <a:spAutoFit/>
-          </a:bodyPr>
-          <a:lstStyle/>
-          <a:p>
-            <a:pPr algn="ctr">
-              <a:lnSpc>
-                <a:spcPts val="617"/>
-              </a:lnSpc>
-            </a:pPr>
-            <a:r>
-              <a:rPr lang="en-US" sz="1000" spc="-4" dirty="0">
-                <a:solidFill>
-                  <a:srgbClr val="000000"/>
-                </a:solidFill>
-                <a:latin typeface="Montserrat Classic"/>
-              </a:rPr>
-              <a:t>@SCHWARZ-SA</a:t>
-            </a:r>
-          </a:p>
-        </p:txBody>
-      </p:sp>
-      <p:sp>
-        <p:nvSpPr>
-          <p:cNvPr id="12" name="TextBox 12"/>
-          <p:cNvSpPr txBox="1"/>
-          <p:nvPr/>
-        </p:nvSpPr>
-        <p:spPr>
-          <a:xfrm>
-            <a:off x="4667373" y="1838011"/>
-            <a:ext cx="1044174" cy="83692"/>
-          </a:xfrm>
-          <a:prstGeom prst="rect">
-            <a:avLst/>
-          </a:prstGeom>
-        </p:spPr>
-        <p:txBody>
-          <a:bodyPr wrap="square" lIns="0" tIns="0" rIns="0" bIns="0" rtlCol="0" anchor="t">
-            <a:spAutoFit/>
-          </a:bodyPr>
-          <a:lstStyle/>
-          <a:p>
-            <a:pPr>
-              <a:lnSpc>
-                <a:spcPts val="617"/>
-              </a:lnSpc>
-            </a:pPr>
-            <a:r>
-              <a:rPr lang="en-US" sz="1000" spc="-4" dirty="0">
-                <a:solidFill>
-                  <a:srgbClr val="000000"/>
-                </a:solidFill>
-                <a:latin typeface="Montserrat Classic"/>
-              </a:rPr>
-              <a:t>/SCHWARZ.SA</a:t>
-            </a:r>
-          </a:p>
-        </p:txBody>
-      </p:sp>
-      <p:sp>
-        <p:nvSpPr>
-          <p:cNvPr id="13" name="TextBox 13"/>
-          <p:cNvSpPr txBox="1"/>
-          <p:nvPr/>
-        </p:nvSpPr>
-        <p:spPr>
-          <a:xfrm>
-            <a:off x="2264468" y="467890"/>
-            <a:ext cx="3327294" cy="325839"/>
-          </a:xfrm>
-          <a:prstGeom prst="rect">
-            <a:avLst/>
-          </a:prstGeom>
-        </p:spPr>
-        <p:txBody>
-          <a:bodyPr wrap="square" lIns="0" tIns="0" rIns="0" bIns="0" rtlCol="0" anchor="t">
-            <a:normAutofit/>
-          </a:bodyPr>
-          <a:lstStyle/>
-          <a:p>
-            <a:pPr>
-              <a:lnSpc>
-                <a:spcPts val="1709"/>
-              </a:lnSpc>
-            </a:pPr>
-            <a:r>
-              <a:rPr lang="en-US" sz="2800" dirty="0">
+              <a:rPr lang="en-US" sz="2013" dirty="0">
                 <a:solidFill>
                   <a:srgbClr val="30AA3D"/>
                 </a:solidFill>
@@ -3588,8 +3577,8 @@
         </p:nvSpPr>
         <p:spPr>
           <a:xfrm>
-            <a:off x="2238571" y="829132"/>
-            <a:ext cx="3611724" cy="124586"/>
+            <a:off x="1440232" y="465337"/>
+            <a:ext cx="2596160" cy="89554"/>
           </a:xfrm>
           <a:prstGeom prst="rect">
             <a:avLst/>
@@ -3603,11 +3592,11 @@
           <a:p>
             <a:pPr>
               <a:lnSpc>
-                <a:spcPts val="895"/>
+                <a:spcPts val="643"/>
               </a:lnSpc>
             </a:pPr>
             <a:r>
-              <a:rPr lang="pt-BR" sz="1200" dirty="0">
+              <a:rPr lang="pt-BR" sz="863" dirty="0">
                 <a:solidFill>
                   <a:srgbClr val="000000"/>
                 </a:solidFill>
@@ -3615,7 +3604,7 @@
               </a:rPr>
               <a:t>CARGOPT</a:t>
             </a:r>
-            <a:endParaRPr lang="en-US" sz="1200" dirty="0">
+            <a:endParaRPr lang="en-US" sz="863" dirty="0">
               <a:solidFill>
                 <a:srgbClr val="000000"/>
               </a:solidFill>
@@ -3632,8 +3621,8 @@
         </p:nvSpPr>
         <p:spPr>
           <a:xfrm>
-            <a:off x="2245573" y="1059720"/>
-            <a:ext cx="3571168" cy="151837"/>
+            <a:off x="1440232" y="653945"/>
+            <a:ext cx="2567008" cy="109143"/>
           </a:xfrm>
           <a:prstGeom prst="rect">
             <a:avLst/>
@@ -3647,11 +3636,11 @@
           <a:p>
             <a:pPr>
               <a:lnSpc>
-                <a:spcPts val="895"/>
+                <a:spcPts val="643"/>
               </a:lnSpc>
             </a:pPr>
             <a:r>
-              <a:rPr lang="en-US" sz="1200">
+              <a:rPr lang="en-US" sz="863">
                 <a:solidFill>
                   <a:srgbClr val="000000"/>
                 </a:solidFill>
@@ -3659,7 +3648,7 @@
               </a:rPr>
               <a:t>CARGOIN</a:t>
             </a:r>
-            <a:endParaRPr lang="en-US" sz="1200" dirty="0">
+            <a:endParaRPr lang="en-US" sz="863" dirty="0">
               <a:solidFill>
                 <a:srgbClr val="000000"/>
               </a:solidFill>
@@ -3668,59 +3657,118 @@
           </a:p>
         </p:txBody>
       </p:sp>
-      <p:sp>
-        <p:nvSpPr>
-          <p:cNvPr id="16" name="Freeform 16"/>
-          <p:cNvSpPr/>
+      <p:grpSp>
+        <p:nvGrpSpPr>
+          <p:cNvPr id="9" name="Agrupar 8">
+            <a:extLst>
+              <a:ext uri="{FF2B5EF4-FFF2-40B4-BE49-F238E27FC236}">
+                <a16:creationId xmlns:a16="http://schemas.microsoft.com/office/drawing/2014/main" id="{12C4F251-F058-7BD1-ACBA-6314191FDBAB}"/>
+              </a:ext>
+            </a:extLst>
+          </p:cNvPr>
+          <p:cNvGrpSpPr/>
           <p:nvPr/>
-        </p:nvSpPr>
-        <p:spPr>
+        </p:nvGrpSpPr>
+        <p:grpSpPr>
           <a:xfrm>
-            <a:off x="3016309" y="1309688"/>
-            <a:ext cx="252000" cy="252000"/>
+            <a:off x="2022803" y="815359"/>
+            <a:ext cx="1411932" cy="181141"/>
+            <a:chOff x="2197723" y="753030"/>
+            <a:chExt cx="1411932" cy="181141"/>
           </a:xfrm>
-          <a:custGeom>
-            <a:avLst/>
-            <a:gdLst/>
-            <a:ahLst/>
-            <a:cxnLst/>
-            <a:rect l="l" t="t" r="r" b="b"/>
-            <a:pathLst>
-              <a:path w="144374" h="144374">
-                <a:moveTo>
-                  <a:pt x="0" y="0"/>
-                </a:moveTo>
-                <a:lnTo>
-                  <a:pt x="144374" y="0"/>
-                </a:lnTo>
-                <a:lnTo>
-                  <a:pt x="144374" y="144374"/>
-                </a:lnTo>
-                <a:lnTo>
-                  <a:pt x="0" y="144374"/>
-                </a:lnTo>
-                <a:lnTo>
-                  <a:pt x="0" y="0"/>
-                </a:lnTo>
-                <a:close/>
-              </a:path>
-            </a:pathLst>
-          </a:custGeom>
-          <a:blipFill>
-            <a:blip r:embed="rId6"/>
-            <a:stretch>
-              <a:fillRect/>
-            </a:stretch>
-          </a:blipFill>
-        </p:spPr>
-        <p:txBody>
-          <a:bodyPr/>
-          <a:lstStyle/>
-          <a:p>
-            <a:endParaRPr sz="1457"/>
-          </a:p>
-        </p:txBody>
-      </p:sp>
+        </p:grpSpPr>
+        <p:sp>
+          <p:nvSpPr>
+            <p:cNvPr id="10" name="TextBox 10"/>
+            <p:cNvSpPr txBox="1"/>
+            <p:nvPr/>
+          </p:nvSpPr>
+          <p:spPr>
+            <a:xfrm>
+              <a:off x="2421929" y="802300"/>
+              <a:ext cx="1187726" cy="120739"/>
+            </a:xfrm>
+            <a:prstGeom prst="rect">
+              <a:avLst/>
+            </a:prstGeom>
+          </p:spPr>
+          <p:txBody>
+            <a:bodyPr wrap="square" lIns="0" tIns="0" rIns="0" bIns="0" rtlCol="0" anchor="t">
+              <a:spAutoFit/>
+            </a:bodyPr>
+            <a:lstStyle/>
+            <a:p>
+              <a:pPr>
+                <a:lnSpc>
+                  <a:spcPts val="903"/>
+                </a:lnSpc>
+              </a:pPr>
+              <a:r>
+                <a:rPr lang="en-US" sz="1294" dirty="0">
+                  <a:solidFill>
+                    <a:srgbClr val="000000"/>
+                  </a:solidFill>
+                  <a:latin typeface="Pathway Gothic One"/>
+                </a:rPr>
+                <a:t>+55 (41) 2106-RAMAL</a:t>
+              </a:r>
+            </a:p>
+          </p:txBody>
+        </p:sp>
+        <p:sp>
+          <p:nvSpPr>
+            <p:cNvPr id="16" name="Freeform 16"/>
+            <p:cNvSpPr/>
+            <p:nvPr/>
+          </p:nvSpPr>
+          <p:spPr>
+            <a:xfrm>
+              <a:off x="2197723" y="753030"/>
+              <a:ext cx="181141" cy="181141"/>
+            </a:xfrm>
+            <a:custGeom>
+              <a:avLst/>
+              <a:gdLst/>
+              <a:ahLst/>
+              <a:cxnLst/>
+              <a:rect l="l" t="t" r="r" b="b"/>
+              <a:pathLst>
+                <a:path w="144374" h="144374">
+                  <a:moveTo>
+                    <a:pt x="0" y="0"/>
+                  </a:moveTo>
+                  <a:lnTo>
+                    <a:pt x="144374" y="0"/>
+                  </a:lnTo>
+                  <a:lnTo>
+                    <a:pt x="144374" y="144374"/>
+                  </a:lnTo>
+                  <a:lnTo>
+                    <a:pt x="0" y="144374"/>
+                  </a:lnTo>
+                  <a:lnTo>
+                    <a:pt x="0" y="0"/>
+                  </a:lnTo>
+                  <a:close/>
+                </a:path>
+              </a:pathLst>
+            </a:custGeom>
+            <a:blipFill>
+              <a:blip r:embed="rId6"/>
+              <a:stretch>
+                <a:fillRect/>
+              </a:stretch>
+            </a:blipFill>
+          </p:spPr>
+          <p:txBody>
+            <a:bodyPr/>
+            <a:lstStyle/>
+            <a:p>
+              <a:endParaRPr sz="1047"/>
+            </a:p>
+          </p:txBody>
+        </p:sp>
+      </p:grpSp>
       <p:sp>
         <p:nvSpPr>
           <p:cNvPr id="4" name="Freeform 8">
@@ -3735,8 +3783,8 @@
         </p:nvSpPr>
         <p:spPr>
           <a:xfrm>
-            <a:off x="2235202" y="1261397"/>
-            <a:ext cx="720000" cy="720000"/>
+            <a:off x="1466951" y="798285"/>
+            <a:ext cx="439767" cy="415545"/>
           </a:xfrm>
           <a:custGeom>
             <a:avLst/>
@@ -3776,7 +3824,7 @@
           <a:bodyPr/>
           <a:lstStyle/>
           <a:p>
-            <a:endParaRPr sz="1457"/>
+            <a:endParaRPr sz="1047"/>
           </a:p>
         </p:txBody>
       </p:sp>
@@ -3808,8 +3856,8 @@
         </p:blipFill>
         <p:spPr>
           <a:xfrm>
-            <a:off x="5878174" y="-16887"/>
-            <a:ext cx="1326785" cy="2305050"/>
+            <a:off x="4054687" y="-8332"/>
+            <a:ext cx="792143" cy="1376208"/>
           </a:xfrm>
           <a:prstGeom prst="rect">
             <a:avLst/>

</xml_diff>

<commit_message>
Desagrupar texto de RAMAL
</commit_message>
<xml_diff>
--- a/Assinatura e-mail Schwarz.pptx
+++ b/Assinatura e-mail Schwarz.pptx
@@ -317,7 +317,7 @@
             <a:fld id="{1D8BD707-D9CF-40AE-B4C6-C98DA3205C09}" type="datetimeFigureOut">
               <a:rPr lang="en-US" smtClean="0"/>
               <a:pPr/>
-              <a:t>6/6/2024</a:t>
+              <a:t>6/17/2024</a:t>
             </a:fld>
             <a:endParaRPr lang="en-US"/>
           </a:p>
@@ -482,7 +482,7 @@
             <a:fld id="{1D8BD707-D9CF-40AE-B4C6-C98DA3205C09}" type="datetimeFigureOut">
               <a:rPr lang="en-US" smtClean="0"/>
               <a:pPr/>
-              <a:t>6/6/2024</a:t>
+              <a:t>6/17/2024</a:t>
             </a:fld>
             <a:endParaRPr lang="en-US"/>
           </a:p>
@@ -657,7 +657,7 @@
             <a:fld id="{1D8BD707-D9CF-40AE-B4C6-C98DA3205C09}" type="datetimeFigureOut">
               <a:rPr lang="en-US" smtClean="0"/>
               <a:pPr/>
-              <a:t>6/6/2024</a:t>
+              <a:t>6/17/2024</a:t>
             </a:fld>
             <a:endParaRPr lang="en-US"/>
           </a:p>
@@ -822,7 +822,7 @@
             <a:fld id="{1D8BD707-D9CF-40AE-B4C6-C98DA3205C09}" type="datetimeFigureOut">
               <a:rPr lang="en-US" smtClean="0"/>
               <a:pPr/>
-              <a:t>6/6/2024</a:t>
+              <a:t>6/17/2024</a:t>
             </a:fld>
             <a:endParaRPr lang="en-US"/>
           </a:p>
@@ -1064,7 +1064,7 @@
             <a:fld id="{1D8BD707-D9CF-40AE-B4C6-C98DA3205C09}" type="datetimeFigureOut">
               <a:rPr lang="en-US" smtClean="0"/>
               <a:pPr/>
-              <a:t>6/6/2024</a:t>
+              <a:t>6/17/2024</a:t>
             </a:fld>
             <a:endParaRPr lang="en-US"/>
           </a:p>
@@ -1346,7 +1346,7 @@
             <a:fld id="{1D8BD707-D9CF-40AE-B4C6-C98DA3205C09}" type="datetimeFigureOut">
               <a:rPr lang="en-US" smtClean="0"/>
               <a:pPr/>
-              <a:t>6/6/2024</a:t>
+              <a:t>6/17/2024</a:t>
             </a:fld>
             <a:endParaRPr lang="en-US"/>
           </a:p>
@@ -1762,7 +1762,7 @@
             <a:fld id="{1D8BD707-D9CF-40AE-B4C6-C98DA3205C09}" type="datetimeFigureOut">
               <a:rPr lang="en-US" smtClean="0"/>
               <a:pPr/>
-              <a:t>6/6/2024</a:t>
+              <a:t>6/17/2024</a:t>
             </a:fld>
             <a:endParaRPr lang="en-US"/>
           </a:p>
@@ -1876,7 +1876,7 @@
             <a:fld id="{1D8BD707-D9CF-40AE-B4C6-C98DA3205C09}" type="datetimeFigureOut">
               <a:rPr lang="en-US" smtClean="0"/>
               <a:pPr/>
-              <a:t>6/6/2024</a:t>
+              <a:t>6/17/2024</a:t>
             </a:fld>
             <a:endParaRPr lang="en-US"/>
           </a:p>
@@ -1968,7 +1968,7 @@
             <a:fld id="{1D8BD707-D9CF-40AE-B4C6-C98DA3205C09}" type="datetimeFigureOut">
               <a:rPr lang="en-US" smtClean="0"/>
               <a:pPr/>
-              <a:t>6/6/2024</a:t>
+              <a:t>6/17/2024</a:t>
             </a:fld>
             <a:endParaRPr lang="en-US"/>
           </a:p>
@@ -2240,7 +2240,7 @@
             <a:fld id="{1D8BD707-D9CF-40AE-B4C6-C98DA3205C09}" type="datetimeFigureOut">
               <a:rPr lang="en-US" smtClean="0"/>
               <a:pPr/>
-              <a:t>6/6/2024</a:t>
+              <a:t>6/17/2024</a:t>
             </a:fld>
             <a:endParaRPr lang="en-US"/>
           </a:p>
@@ -2489,7 +2489,7 @@
             <a:fld id="{1D8BD707-D9CF-40AE-B4C6-C98DA3205C09}" type="datetimeFigureOut">
               <a:rPr lang="en-US" smtClean="0"/>
               <a:pPr/>
-              <a:t>6/6/2024</a:t>
+              <a:t>6/17/2024</a:t>
             </a:fld>
             <a:endParaRPr lang="en-US"/>
           </a:p>
@@ -2697,7 +2697,7 @@
             <a:fld id="{1D8BD707-D9CF-40AE-B4C6-C98DA3205C09}" type="datetimeFigureOut">
               <a:rPr lang="en-US" smtClean="0"/>
               <a:pPr/>
-              <a:t>6/6/2024</a:t>
+              <a:t>6/17/2024</a:t>
             </a:fld>
             <a:endParaRPr lang="en-US"/>
           </a:p>
@@ -3657,118 +3657,97 @@
           </a:p>
         </p:txBody>
       </p:sp>
-      <p:grpSp>
-        <p:nvGrpSpPr>
-          <p:cNvPr id="9" name="Agrupar 8">
-            <a:extLst>
-              <a:ext uri="{FF2B5EF4-FFF2-40B4-BE49-F238E27FC236}">
-                <a16:creationId xmlns:a16="http://schemas.microsoft.com/office/drawing/2014/main" id="{12C4F251-F058-7BD1-ACBA-6314191FDBAB}"/>
-              </a:ext>
-            </a:extLst>
-          </p:cNvPr>
-          <p:cNvGrpSpPr/>
+      <p:sp>
+        <p:nvSpPr>
+          <p:cNvPr id="10" name="TextBox 10"/>
+          <p:cNvSpPr txBox="1"/>
           <p:nvPr/>
-        </p:nvGrpSpPr>
-        <p:grpSpPr>
+        </p:nvSpPr>
+        <p:spPr>
+          <a:xfrm>
+            <a:off x="2247009" y="864629"/>
+            <a:ext cx="1187726" cy="120739"/>
+          </a:xfrm>
+          <a:prstGeom prst="rect">
+            <a:avLst/>
+          </a:prstGeom>
+        </p:spPr>
+        <p:txBody>
+          <a:bodyPr wrap="square" lIns="0" tIns="0" rIns="0" bIns="0" rtlCol="0" anchor="t">
+            <a:spAutoFit/>
+          </a:bodyPr>
+          <a:lstStyle/>
+          <a:p>
+            <a:pPr>
+              <a:lnSpc>
+                <a:spcPts val="903"/>
+              </a:lnSpc>
+            </a:pPr>
+            <a:r>
+              <a:rPr lang="en-US" sz="1294" dirty="0">
+                <a:solidFill>
+                  <a:srgbClr val="000000"/>
+                </a:solidFill>
+                <a:latin typeface="Pathway Gothic One"/>
+              </a:rPr>
+              <a:t>+55 (41) 2106-RAMAL</a:t>
+            </a:r>
+          </a:p>
+        </p:txBody>
+      </p:sp>
+      <p:sp>
+        <p:nvSpPr>
+          <p:cNvPr id="16" name="Freeform 16"/>
+          <p:cNvSpPr/>
+          <p:nvPr/>
+        </p:nvSpPr>
+        <p:spPr>
           <a:xfrm>
             <a:off x="2022803" y="815359"/>
-            <a:ext cx="1411932" cy="181141"/>
-            <a:chOff x="2197723" y="753030"/>
-            <a:chExt cx="1411932" cy="181141"/>
+            <a:ext cx="181141" cy="181141"/>
           </a:xfrm>
-        </p:grpSpPr>
-        <p:sp>
-          <p:nvSpPr>
-            <p:cNvPr id="10" name="TextBox 10"/>
-            <p:cNvSpPr txBox="1"/>
-            <p:nvPr/>
-          </p:nvSpPr>
-          <p:spPr>
-            <a:xfrm>
-              <a:off x="2421929" y="802300"/>
-              <a:ext cx="1187726" cy="120739"/>
-            </a:xfrm>
-            <a:prstGeom prst="rect">
-              <a:avLst/>
-            </a:prstGeom>
-          </p:spPr>
-          <p:txBody>
-            <a:bodyPr wrap="square" lIns="0" tIns="0" rIns="0" bIns="0" rtlCol="0" anchor="t">
-              <a:spAutoFit/>
-            </a:bodyPr>
-            <a:lstStyle/>
-            <a:p>
-              <a:pPr>
-                <a:lnSpc>
-                  <a:spcPts val="903"/>
-                </a:lnSpc>
-              </a:pPr>
-              <a:r>
-                <a:rPr lang="en-US" sz="1294" dirty="0">
-                  <a:solidFill>
-                    <a:srgbClr val="000000"/>
-                  </a:solidFill>
-                  <a:latin typeface="Pathway Gothic One"/>
-                </a:rPr>
-                <a:t>+55 (41) 2106-RAMAL</a:t>
-              </a:r>
-            </a:p>
-          </p:txBody>
-        </p:sp>
-        <p:sp>
-          <p:nvSpPr>
-            <p:cNvPr id="16" name="Freeform 16"/>
-            <p:cNvSpPr/>
-            <p:nvPr/>
-          </p:nvSpPr>
-          <p:spPr>
-            <a:xfrm>
-              <a:off x="2197723" y="753030"/>
-              <a:ext cx="181141" cy="181141"/>
-            </a:xfrm>
-            <a:custGeom>
-              <a:avLst/>
-              <a:gdLst/>
-              <a:ahLst/>
-              <a:cxnLst/>
-              <a:rect l="l" t="t" r="r" b="b"/>
-              <a:pathLst>
-                <a:path w="144374" h="144374">
-                  <a:moveTo>
-                    <a:pt x="0" y="0"/>
-                  </a:moveTo>
-                  <a:lnTo>
-                    <a:pt x="144374" y="0"/>
-                  </a:lnTo>
-                  <a:lnTo>
-                    <a:pt x="144374" y="144374"/>
-                  </a:lnTo>
-                  <a:lnTo>
-                    <a:pt x="0" y="144374"/>
-                  </a:lnTo>
-                  <a:lnTo>
-                    <a:pt x="0" y="0"/>
-                  </a:lnTo>
-                  <a:close/>
-                </a:path>
-              </a:pathLst>
-            </a:custGeom>
-            <a:blipFill>
-              <a:blip r:embed="rId6"/>
-              <a:stretch>
-                <a:fillRect/>
-              </a:stretch>
-            </a:blipFill>
-          </p:spPr>
-          <p:txBody>
-            <a:bodyPr/>
-            <a:lstStyle/>
-            <a:p>
-              <a:endParaRPr sz="1047"/>
-            </a:p>
-          </p:txBody>
-        </p:sp>
-      </p:grpSp>
+          <a:custGeom>
+            <a:avLst/>
+            <a:gdLst/>
+            <a:ahLst/>
+            <a:cxnLst/>
+            <a:rect l="l" t="t" r="r" b="b"/>
+            <a:pathLst>
+              <a:path w="144374" h="144374">
+                <a:moveTo>
+                  <a:pt x="0" y="0"/>
+                </a:moveTo>
+                <a:lnTo>
+                  <a:pt x="144374" y="0"/>
+                </a:lnTo>
+                <a:lnTo>
+                  <a:pt x="144374" y="144374"/>
+                </a:lnTo>
+                <a:lnTo>
+                  <a:pt x="0" y="144374"/>
+                </a:lnTo>
+                <a:lnTo>
+                  <a:pt x="0" y="0"/>
+                </a:lnTo>
+                <a:close/>
+              </a:path>
+            </a:pathLst>
+          </a:custGeom>
+          <a:blipFill>
+            <a:blip r:embed="rId6"/>
+            <a:stretch>
+              <a:fillRect/>
+            </a:stretch>
+          </a:blipFill>
+        </p:spPr>
+        <p:txBody>
+          <a:bodyPr/>
+          <a:lstStyle/>
+          <a:p>
+            <a:endParaRPr sz="1047"/>
+          </a:p>
+        </p:txBody>
+      </p:sp>
       <p:sp>
         <p:nvSpPr>
           <p:cNvPr id="4" name="Freeform 8">

</xml_diff>

<commit_message>
:lipstick: Alinhar e corrigir tamanho dos ícones da assinatura
</commit_message>
<xml_diff>
--- a/Assinatura e-mail Schwarz.pptx
+++ b/Assinatura e-mail Schwarz.pptx
@@ -4,23 +4,26 @@
   <p:sldMasterIdLst>
     <p:sldMasterId id="2147483648" r:id="rId1"/>
   </p:sldMasterIdLst>
+  <p:notesMasterIdLst>
+    <p:notesMasterId r:id="rId3"/>
+  </p:notesMasterIdLst>
   <p:sldIdLst>
-    <p:sldId id="257" r:id="rId2"/>
+    <p:sldId id="258" r:id="rId2"/>
   </p:sldIdLst>
   <p:sldSz cx="4967288" cy="1403350"/>
   <p:notesSz cx="6858000" cy="9144000"/>
   <p:embeddedFontLst>
     <p:embeddedFont>
       <p:font typeface="Montserrat Classic" panose="020B0604020202020204" charset="0"/>
-      <p:regular r:id="rId3"/>
+      <p:regular r:id="rId4"/>
     </p:embeddedFont>
     <p:embeddedFont>
       <p:font typeface="Montserrat Semi-Bold Bold" panose="020B0604020202020204" charset="0"/>
-      <p:regular r:id="rId4"/>
+      <p:regular r:id="rId5"/>
     </p:embeddedFont>
     <p:embeddedFont>
       <p:font typeface="Pathway Gothic One" panose="020B0604020202020204" charset="0"/>
-      <p:regular r:id="rId5"/>
+      <p:regular r:id="rId6"/>
     </p:embeddedFont>
   </p:embeddedFontLst>
   <p:defaultTextStyle>
@@ -137,6 +140,439 @@
 </p:presentation>
 </file>
 
+<file path=ppt/notesMasters/notesMaster1.xml><?xml version="1.0" encoding="utf-8"?>
+<p:notesMaster xmlns:a="http://schemas.openxmlformats.org/drawingml/2006/main" xmlns:r="http://schemas.openxmlformats.org/officeDocument/2006/relationships" xmlns:p="http://schemas.openxmlformats.org/presentationml/2006/main">
+  <p:cSld>
+    <p:bg>
+      <p:bgRef idx="1001">
+        <a:schemeClr val="bg1"/>
+      </p:bgRef>
+    </p:bg>
+    <p:spTree>
+      <p:nvGrpSpPr>
+        <p:cNvPr id="1" name=""/>
+        <p:cNvGrpSpPr/>
+        <p:nvPr/>
+      </p:nvGrpSpPr>
+      <p:grpSpPr>
+        <a:xfrm>
+          <a:off x="0" y="0"/>
+          <a:ext cx="0" cy="0"/>
+          <a:chOff x="0" y="0"/>
+          <a:chExt cx="0" cy="0"/>
+        </a:xfrm>
+      </p:grpSpPr>
+      <p:sp>
+        <p:nvSpPr>
+          <p:cNvPr id="2" name="Espaço Reservado para Cabeçalho 1"/>
+          <p:cNvSpPr>
+            <a:spLocks noGrp="1"/>
+          </p:cNvSpPr>
+          <p:nvPr>
+            <p:ph type="hdr" sz="quarter"/>
+          </p:nvPr>
+        </p:nvSpPr>
+        <p:spPr>
+          <a:xfrm>
+            <a:off x="0" y="0"/>
+            <a:ext cx="2971800" cy="458788"/>
+          </a:xfrm>
+          <a:prstGeom prst="rect">
+            <a:avLst/>
+          </a:prstGeom>
+        </p:spPr>
+        <p:txBody>
+          <a:bodyPr vert="horz" lIns="91440" tIns="45720" rIns="91440" bIns="45720" rtlCol="0"/>
+          <a:lstStyle>
+            <a:lvl1pPr algn="l">
+              <a:defRPr sz="1200"/>
+            </a:lvl1pPr>
+          </a:lstStyle>
+          <a:p>
+            <a:endParaRPr lang="pt-BR"/>
+          </a:p>
+        </p:txBody>
+      </p:sp>
+      <p:sp>
+        <p:nvSpPr>
+          <p:cNvPr id="3" name="Espaço Reservado para Data 2"/>
+          <p:cNvSpPr>
+            <a:spLocks noGrp="1"/>
+          </p:cNvSpPr>
+          <p:nvPr>
+            <p:ph type="dt" idx="1"/>
+          </p:nvPr>
+        </p:nvSpPr>
+        <p:spPr>
+          <a:xfrm>
+            <a:off x="3884613" y="0"/>
+            <a:ext cx="2971800" cy="458788"/>
+          </a:xfrm>
+          <a:prstGeom prst="rect">
+            <a:avLst/>
+          </a:prstGeom>
+        </p:spPr>
+        <p:txBody>
+          <a:bodyPr vert="horz" lIns="91440" tIns="45720" rIns="91440" bIns="45720" rtlCol="0"/>
+          <a:lstStyle>
+            <a:lvl1pPr algn="r">
+              <a:defRPr sz="1200"/>
+            </a:lvl1pPr>
+          </a:lstStyle>
+          <a:p>
+            <a:fld id="{0033826D-BF54-438B-9707-919959F77F61}" type="datetimeFigureOut">
+              <a:rPr lang="pt-BR" smtClean="0"/>
+              <a:t>04/09/2024</a:t>
+            </a:fld>
+            <a:endParaRPr lang="pt-BR"/>
+          </a:p>
+        </p:txBody>
+      </p:sp>
+      <p:sp>
+        <p:nvSpPr>
+          <p:cNvPr id="4" name="Espaço Reservado para Imagem de Slide 3"/>
+          <p:cNvSpPr>
+            <a:spLocks noGrp="1" noRot="1" noChangeAspect="1"/>
+          </p:cNvSpPr>
+          <p:nvPr>
+            <p:ph type="sldImg" idx="2"/>
+          </p:nvPr>
+        </p:nvSpPr>
+        <p:spPr>
+          <a:xfrm>
+            <a:off x="-2032000" y="1143000"/>
+            <a:ext cx="10922000" cy="3086100"/>
+          </a:xfrm>
+          <a:prstGeom prst="rect">
+            <a:avLst/>
+          </a:prstGeom>
+          <a:noFill/>
+          <a:ln w="12700">
+            <a:solidFill>
+              <a:prstClr val="black"/>
+            </a:solidFill>
+          </a:ln>
+        </p:spPr>
+        <p:txBody>
+          <a:bodyPr vert="horz" lIns="91440" tIns="45720" rIns="91440" bIns="45720" rtlCol="0" anchor="ctr"/>
+          <a:lstStyle/>
+          <a:p>
+            <a:endParaRPr lang="pt-BR"/>
+          </a:p>
+        </p:txBody>
+      </p:sp>
+      <p:sp>
+        <p:nvSpPr>
+          <p:cNvPr id="5" name="Espaço Reservado para Anotações 4"/>
+          <p:cNvSpPr>
+            <a:spLocks noGrp="1"/>
+          </p:cNvSpPr>
+          <p:nvPr>
+            <p:ph type="body" sz="quarter" idx="3"/>
+          </p:nvPr>
+        </p:nvSpPr>
+        <p:spPr>
+          <a:xfrm>
+            <a:off x="685800" y="4400550"/>
+            <a:ext cx="5486400" cy="3600450"/>
+          </a:xfrm>
+          <a:prstGeom prst="rect">
+            <a:avLst/>
+          </a:prstGeom>
+        </p:spPr>
+        <p:txBody>
+          <a:bodyPr vert="horz" lIns="91440" tIns="45720" rIns="91440" bIns="45720" rtlCol="0"/>
+          <a:lstStyle/>
+          <a:p>
+            <a:pPr lvl="0"/>
+            <a:r>
+              <a:rPr lang="pt-BR"/>
+              <a:t>Clique para editar os estilos de texto Mestres</a:t>
+            </a:r>
+          </a:p>
+          <a:p>
+            <a:pPr lvl="1"/>
+            <a:r>
+              <a:rPr lang="pt-BR"/>
+              <a:t>Segundo nível</a:t>
+            </a:r>
+          </a:p>
+          <a:p>
+            <a:pPr lvl="2"/>
+            <a:r>
+              <a:rPr lang="pt-BR"/>
+              <a:t>Terceiro nível</a:t>
+            </a:r>
+          </a:p>
+          <a:p>
+            <a:pPr lvl="3"/>
+            <a:r>
+              <a:rPr lang="pt-BR"/>
+              <a:t>Quarto nível</a:t>
+            </a:r>
+          </a:p>
+          <a:p>
+            <a:pPr lvl="4"/>
+            <a:r>
+              <a:rPr lang="pt-BR"/>
+              <a:t>Quinto nível</a:t>
+            </a:r>
+          </a:p>
+        </p:txBody>
+      </p:sp>
+      <p:sp>
+        <p:nvSpPr>
+          <p:cNvPr id="6" name="Espaço Reservado para Rodapé 5"/>
+          <p:cNvSpPr>
+            <a:spLocks noGrp="1"/>
+          </p:cNvSpPr>
+          <p:nvPr>
+            <p:ph type="ftr" sz="quarter" idx="4"/>
+          </p:nvPr>
+        </p:nvSpPr>
+        <p:spPr>
+          <a:xfrm>
+            <a:off x="0" y="8685213"/>
+            <a:ext cx="2971800" cy="458787"/>
+          </a:xfrm>
+          <a:prstGeom prst="rect">
+            <a:avLst/>
+          </a:prstGeom>
+        </p:spPr>
+        <p:txBody>
+          <a:bodyPr vert="horz" lIns="91440" tIns="45720" rIns="91440" bIns="45720" rtlCol="0" anchor="b"/>
+          <a:lstStyle>
+            <a:lvl1pPr algn="l">
+              <a:defRPr sz="1200"/>
+            </a:lvl1pPr>
+          </a:lstStyle>
+          <a:p>
+            <a:endParaRPr lang="pt-BR"/>
+          </a:p>
+        </p:txBody>
+      </p:sp>
+      <p:sp>
+        <p:nvSpPr>
+          <p:cNvPr id="7" name="Espaço Reservado para Número de Slide 6"/>
+          <p:cNvSpPr>
+            <a:spLocks noGrp="1"/>
+          </p:cNvSpPr>
+          <p:nvPr>
+            <p:ph type="sldNum" sz="quarter" idx="5"/>
+          </p:nvPr>
+        </p:nvSpPr>
+        <p:spPr>
+          <a:xfrm>
+            <a:off x="3884613" y="8685213"/>
+            <a:ext cx="2971800" cy="458787"/>
+          </a:xfrm>
+          <a:prstGeom prst="rect">
+            <a:avLst/>
+          </a:prstGeom>
+        </p:spPr>
+        <p:txBody>
+          <a:bodyPr vert="horz" lIns="91440" tIns="45720" rIns="91440" bIns="45720" rtlCol="0" anchor="b"/>
+          <a:lstStyle>
+            <a:lvl1pPr algn="r">
+              <a:defRPr sz="1200"/>
+            </a:lvl1pPr>
+          </a:lstStyle>
+          <a:p>
+            <a:fld id="{0BE5F21D-737E-4AA8-BC19-08D51799F631}" type="slidenum">
+              <a:rPr lang="pt-BR" smtClean="0"/>
+              <a:t>‹nº›</a:t>
+            </a:fld>
+            <a:endParaRPr lang="pt-BR"/>
+          </a:p>
+        </p:txBody>
+      </p:sp>
+    </p:spTree>
+    <p:extLst>
+      <p:ext uri="{BB962C8B-B14F-4D97-AF65-F5344CB8AC3E}">
+        <p14:creationId xmlns:p14="http://schemas.microsoft.com/office/powerpoint/2010/main" val="1759447642"/>
+      </p:ext>
+    </p:extLst>
+  </p:cSld>
+  <p:clrMap bg1="lt1" tx1="dk1" bg2="lt2" tx2="dk2" accent1="accent1" accent2="accent2" accent3="accent3" accent4="accent4" accent5="accent5" accent6="accent6" hlink="hlink" folHlink="folHlink"/>
+  <p:notesStyle>
+    <a:lvl1pPr marL="0" algn="l" defTabSz="914400" rtl="0" eaLnBrk="1" latinLnBrk="0" hangingPunct="1">
+      <a:defRPr sz="1200" kern="1200">
+        <a:solidFill>
+          <a:schemeClr val="tx1"/>
+        </a:solidFill>
+        <a:latin typeface="+mn-lt"/>
+        <a:ea typeface="+mn-ea"/>
+        <a:cs typeface="+mn-cs"/>
+      </a:defRPr>
+    </a:lvl1pPr>
+    <a:lvl2pPr marL="457200" algn="l" defTabSz="914400" rtl="0" eaLnBrk="1" latinLnBrk="0" hangingPunct="1">
+      <a:defRPr sz="1200" kern="1200">
+        <a:solidFill>
+          <a:schemeClr val="tx1"/>
+        </a:solidFill>
+        <a:latin typeface="+mn-lt"/>
+        <a:ea typeface="+mn-ea"/>
+        <a:cs typeface="+mn-cs"/>
+      </a:defRPr>
+    </a:lvl2pPr>
+    <a:lvl3pPr marL="914400" algn="l" defTabSz="914400" rtl="0" eaLnBrk="1" latinLnBrk="0" hangingPunct="1">
+      <a:defRPr sz="1200" kern="1200">
+        <a:solidFill>
+          <a:schemeClr val="tx1"/>
+        </a:solidFill>
+        <a:latin typeface="+mn-lt"/>
+        <a:ea typeface="+mn-ea"/>
+        <a:cs typeface="+mn-cs"/>
+      </a:defRPr>
+    </a:lvl3pPr>
+    <a:lvl4pPr marL="1371600" algn="l" defTabSz="914400" rtl="0" eaLnBrk="1" latinLnBrk="0" hangingPunct="1">
+      <a:defRPr sz="1200" kern="1200">
+        <a:solidFill>
+          <a:schemeClr val="tx1"/>
+        </a:solidFill>
+        <a:latin typeface="+mn-lt"/>
+        <a:ea typeface="+mn-ea"/>
+        <a:cs typeface="+mn-cs"/>
+      </a:defRPr>
+    </a:lvl4pPr>
+    <a:lvl5pPr marL="1828800" algn="l" defTabSz="914400" rtl="0" eaLnBrk="1" latinLnBrk="0" hangingPunct="1">
+      <a:defRPr sz="1200" kern="1200">
+        <a:solidFill>
+          <a:schemeClr val="tx1"/>
+        </a:solidFill>
+        <a:latin typeface="+mn-lt"/>
+        <a:ea typeface="+mn-ea"/>
+        <a:cs typeface="+mn-cs"/>
+      </a:defRPr>
+    </a:lvl5pPr>
+    <a:lvl6pPr marL="2286000" algn="l" defTabSz="914400" rtl="0" eaLnBrk="1" latinLnBrk="0" hangingPunct="1">
+      <a:defRPr sz="1200" kern="1200">
+        <a:solidFill>
+          <a:schemeClr val="tx1"/>
+        </a:solidFill>
+        <a:latin typeface="+mn-lt"/>
+        <a:ea typeface="+mn-ea"/>
+        <a:cs typeface="+mn-cs"/>
+      </a:defRPr>
+    </a:lvl6pPr>
+    <a:lvl7pPr marL="2743200" algn="l" defTabSz="914400" rtl="0" eaLnBrk="1" latinLnBrk="0" hangingPunct="1">
+      <a:defRPr sz="1200" kern="1200">
+        <a:solidFill>
+          <a:schemeClr val="tx1"/>
+        </a:solidFill>
+        <a:latin typeface="+mn-lt"/>
+        <a:ea typeface="+mn-ea"/>
+        <a:cs typeface="+mn-cs"/>
+      </a:defRPr>
+    </a:lvl7pPr>
+    <a:lvl8pPr marL="3200400" algn="l" defTabSz="914400" rtl="0" eaLnBrk="1" latinLnBrk="0" hangingPunct="1">
+      <a:defRPr sz="1200" kern="1200">
+        <a:solidFill>
+          <a:schemeClr val="tx1"/>
+        </a:solidFill>
+        <a:latin typeface="+mn-lt"/>
+        <a:ea typeface="+mn-ea"/>
+        <a:cs typeface="+mn-cs"/>
+      </a:defRPr>
+    </a:lvl8pPr>
+    <a:lvl9pPr marL="3657600" algn="l" defTabSz="914400" rtl="0" eaLnBrk="1" latinLnBrk="0" hangingPunct="1">
+      <a:defRPr sz="1200" kern="1200">
+        <a:solidFill>
+          <a:schemeClr val="tx1"/>
+        </a:solidFill>
+        <a:latin typeface="+mn-lt"/>
+        <a:ea typeface="+mn-ea"/>
+        <a:cs typeface="+mn-cs"/>
+      </a:defRPr>
+    </a:lvl9pPr>
+  </p:notesStyle>
+</p:notesMaster>
+</file>
+
+<file path=ppt/notesSlides/notesSlide1.xml><?xml version="1.0" encoding="utf-8"?>
+<p:notes xmlns:a="http://schemas.openxmlformats.org/drawingml/2006/main" xmlns:r="http://schemas.openxmlformats.org/officeDocument/2006/relationships" xmlns:p="http://schemas.openxmlformats.org/presentationml/2006/main">
+  <p:cSld>
+    <p:spTree>
+      <p:nvGrpSpPr>
+        <p:cNvPr id="1" name=""/>
+        <p:cNvGrpSpPr/>
+        <p:nvPr/>
+      </p:nvGrpSpPr>
+      <p:grpSpPr>
+        <a:xfrm>
+          <a:off x="0" y="0"/>
+          <a:ext cx="0" cy="0"/>
+          <a:chOff x="0" y="0"/>
+          <a:chExt cx="0" cy="0"/>
+        </a:xfrm>
+      </p:grpSpPr>
+      <p:sp>
+        <p:nvSpPr>
+          <p:cNvPr id="2" name="Espaço Reservado para Imagem de Slide 1"/>
+          <p:cNvSpPr>
+            <a:spLocks noGrp="1" noRot="1" noChangeAspect="1"/>
+          </p:cNvSpPr>
+          <p:nvPr>
+            <p:ph type="sldImg"/>
+          </p:nvPr>
+        </p:nvSpPr>
+        <p:spPr/>
+      </p:sp>
+      <p:sp>
+        <p:nvSpPr>
+          <p:cNvPr id="3" name="Espaço Reservado para Anotações 2"/>
+          <p:cNvSpPr>
+            <a:spLocks noGrp="1"/>
+          </p:cNvSpPr>
+          <p:nvPr>
+            <p:ph type="body" idx="1"/>
+          </p:nvPr>
+        </p:nvSpPr>
+        <p:spPr/>
+        <p:txBody>
+          <a:bodyPr/>
+          <a:lstStyle/>
+          <a:p>
+            <a:endParaRPr lang="pt-BR" dirty="0"/>
+          </a:p>
+        </p:txBody>
+      </p:sp>
+      <p:sp>
+        <p:nvSpPr>
+          <p:cNvPr id="4" name="Espaço Reservado para Número de Slide 3"/>
+          <p:cNvSpPr>
+            <a:spLocks noGrp="1"/>
+          </p:cNvSpPr>
+          <p:nvPr>
+            <p:ph type="sldNum" sz="quarter" idx="5"/>
+          </p:nvPr>
+        </p:nvSpPr>
+        <p:spPr/>
+        <p:txBody>
+          <a:bodyPr/>
+          <a:lstStyle/>
+          <a:p>
+            <a:fld id="{0BE5F21D-737E-4AA8-BC19-08D51799F631}" type="slidenum">
+              <a:rPr lang="pt-BR" smtClean="0"/>
+              <a:t>1</a:t>
+            </a:fld>
+            <a:endParaRPr lang="pt-BR"/>
+          </a:p>
+        </p:txBody>
+      </p:sp>
+    </p:spTree>
+    <p:extLst>
+      <p:ext uri="{BB962C8B-B14F-4D97-AF65-F5344CB8AC3E}">
+        <p14:creationId xmlns:p14="http://schemas.microsoft.com/office/powerpoint/2010/main" val="3486148615"/>
+      </p:ext>
+    </p:extLst>
+  </p:cSld>
+  <p:clrMapOvr>
+    <a:masterClrMapping/>
+  </p:clrMapOvr>
+</p:notes>
+</file>
+
 <file path=ppt/slideLayouts/slideLayout1.xml><?xml version="1.0" encoding="utf-8"?>
 <p:sldLayout xmlns:a="http://schemas.openxmlformats.org/drawingml/2006/main" xmlns:r="http://schemas.openxmlformats.org/officeDocument/2006/relationships" xmlns:p="http://schemas.openxmlformats.org/presentationml/2006/main" type="title" preserve="1">
   <p:cSld name="Title Slide">
@@ -317,7 +753,7 @@
             <a:fld id="{1D8BD707-D9CF-40AE-B4C6-C98DA3205C09}" type="datetimeFigureOut">
               <a:rPr lang="en-US" smtClean="0"/>
               <a:pPr/>
-              <a:t>6/17/2024</a:t>
+              <a:t>9/4/2024</a:t>
             </a:fld>
             <a:endParaRPr lang="en-US"/>
           </a:p>
@@ -482,7 +918,7 @@
             <a:fld id="{1D8BD707-D9CF-40AE-B4C6-C98DA3205C09}" type="datetimeFigureOut">
               <a:rPr lang="en-US" smtClean="0"/>
               <a:pPr/>
-              <a:t>6/17/2024</a:t>
+              <a:t>9/4/2024</a:t>
             </a:fld>
             <a:endParaRPr lang="en-US"/>
           </a:p>
@@ -657,7 +1093,7 @@
             <a:fld id="{1D8BD707-D9CF-40AE-B4C6-C98DA3205C09}" type="datetimeFigureOut">
               <a:rPr lang="en-US" smtClean="0"/>
               <a:pPr/>
-              <a:t>6/17/2024</a:t>
+              <a:t>9/4/2024</a:t>
             </a:fld>
             <a:endParaRPr lang="en-US"/>
           </a:p>
@@ -822,7 +1258,7 @@
             <a:fld id="{1D8BD707-D9CF-40AE-B4C6-C98DA3205C09}" type="datetimeFigureOut">
               <a:rPr lang="en-US" smtClean="0"/>
               <a:pPr/>
-              <a:t>6/17/2024</a:t>
+              <a:t>9/4/2024</a:t>
             </a:fld>
             <a:endParaRPr lang="en-US"/>
           </a:p>
@@ -1064,7 +1500,7 @@
             <a:fld id="{1D8BD707-D9CF-40AE-B4C6-C98DA3205C09}" type="datetimeFigureOut">
               <a:rPr lang="en-US" smtClean="0"/>
               <a:pPr/>
-              <a:t>6/17/2024</a:t>
+              <a:t>9/4/2024</a:t>
             </a:fld>
             <a:endParaRPr lang="en-US"/>
           </a:p>
@@ -1346,7 +1782,7 @@
             <a:fld id="{1D8BD707-D9CF-40AE-B4C6-C98DA3205C09}" type="datetimeFigureOut">
               <a:rPr lang="en-US" smtClean="0"/>
               <a:pPr/>
-              <a:t>6/17/2024</a:t>
+              <a:t>9/4/2024</a:t>
             </a:fld>
             <a:endParaRPr lang="en-US"/>
           </a:p>
@@ -1762,7 +2198,7 @@
             <a:fld id="{1D8BD707-D9CF-40AE-B4C6-C98DA3205C09}" type="datetimeFigureOut">
               <a:rPr lang="en-US" smtClean="0"/>
               <a:pPr/>
-              <a:t>6/17/2024</a:t>
+              <a:t>9/4/2024</a:t>
             </a:fld>
             <a:endParaRPr lang="en-US"/>
           </a:p>
@@ -1876,7 +2312,7 @@
             <a:fld id="{1D8BD707-D9CF-40AE-B4C6-C98DA3205C09}" type="datetimeFigureOut">
               <a:rPr lang="en-US" smtClean="0"/>
               <a:pPr/>
-              <a:t>6/17/2024</a:t>
+              <a:t>9/4/2024</a:t>
             </a:fld>
             <a:endParaRPr lang="en-US"/>
           </a:p>
@@ -1968,7 +2404,7 @@
             <a:fld id="{1D8BD707-D9CF-40AE-B4C6-C98DA3205C09}" type="datetimeFigureOut">
               <a:rPr lang="en-US" smtClean="0"/>
               <a:pPr/>
-              <a:t>6/17/2024</a:t>
+              <a:t>9/4/2024</a:t>
             </a:fld>
             <a:endParaRPr lang="en-US"/>
           </a:p>
@@ -2240,7 +2676,7 @@
             <a:fld id="{1D8BD707-D9CF-40AE-B4C6-C98DA3205C09}" type="datetimeFigureOut">
               <a:rPr lang="en-US" smtClean="0"/>
               <a:pPr/>
-              <a:t>6/17/2024</a:t>
+              <a:t>9/4/2024</a:t>
             </a:fld>
             <a:endParaRPr lang="en-US"/>
           </a:p>
@@ -2489,7 +2925,7 @@
             <a:fld id="{1D8BD707-D9CF-40AE-B4C6-C98DA3205C09}" type="datetimeFigureOut">
               <a:rPr lang="en-US" smtClean="0"/>
               <a:pPr/>
-              <a:t>6/17/2024</a:t>
+              <a:t>9/4/2024</a:t>
             </a:fld>
             <a:endParaRPr lang="en-US"/>
           </a:p>
@@ -2697,7 +3133,7 @@
             <a:fld id="{1D8BD707-D9CF-40AE-B4C6-C98DA3205C09}" type="datetimeFigureOut">
               <a:rPr lang="en-US" smtClean="0"/>
               <a:pPr/>
-              <a:t>6/17/2024</a:t>
+              <a:t>9/4/2024</a:t>
             </a:fld>
             <a:endParaRPr lang="en-US"/>
           </a:p>
@@ -3107,7 +3543,7 @@
             </a:pathLst>
           </a:custGeom>
           <a:blipFill>
-            <a:blip r:embed="rId2"/>
+            <a:blip r:embed="rId3"/>
             <a:stretch>
               <a:fillRect/>
             </a:stretch>
@@ -3186,7 +3622,7 @@
               </a:pathLst>
             </a:custGeom>
             <a:blipFill>
-              <a:blip r:embed="rId3"/>
+              <a:blip r:embed="rId4"/>
               <a:stretch>
                 <a:fillRect l="-328379" t="-27792" r="-24049" b="-374976"/>
               </a:stretch>
@@ -3239,7 +3675,7 @@
               </a:pathLst>
             </a:custGeom>
             <a:blipFill>
-              <a:blip r:embed="rId3"/>
+              <a:blip r:embed="rId4"/>
               <a:stretch>
                 <a:fillRect l="-265366" t="-27792" r="-246" b="-374976"/>
               </a:stretch>
@@ -3293,7 +3729,7 @@
             </a:pathLst>
           </a:custGeom>
           <a:blipFill>
-            <a:blip r:embed="rId3"/>
+            <a:blip r:embed="rId4"/>
             <a:stretch>
               <a:fillRect l="-11751" t="-90412" r="-245585" b="-98254"/>
             </a:stretch>
@@ -3321,22 +3757,24 @@
         </p:nvGrpSpPr>
         <p:grpSpPr>
           <a:xfrm>
-            <a:off x="2024981" y="1066894"/>
-            <a:ext cx="1103715" cy="181141"/>
-            <a:chOff x="2191703" y="1045081"/>
-            <a:chExt cx="1200766" cy="181141"/>
+            <a:off x="2033342" y="1006475"/>
+            <a:ext cx="901794" cy="136056"/>
+            <a:chOff x="2213956" y="1071790"/>
+            <a:chExt cx="981090" cy="136056"/>
           </a:xfrm>
         </p:grpSpPr>
         <p:sp>
           <p:nvSpPr>
             <p:cNvPr id="6" name="Freeform 6"/>
-            <p:cNvSpPr/>
+            <p:cNvSpPr>
+              <a:spLocks noChangeAspect="1"/>
+            </p:cNvSpPr>
             <p:nvPr/>
           </p:nvSpPr>
           <p:spPr>
             <a:xfrm>
-              <a:off x="2191703" y="1045081"/>
-              <a:ext cx="181141" cy="181141"/>
+              <a:off x="2213956" y="1071790"/>
+              <a:ext cx="136056" cy="136056"/>
             </a:xfrm>
             <a:custGeom>
               <a:avLst/>
@@ -3366,7 +3804,7 @@
               </a:pathLst>
             </a:custGeom>
             <a:blipFill>
-              <a:blip r:embed="rId4"/>
+              <a:blip r:embed="rId5"/>
               <a:stretch>
                 <a:fillRect/>
               </a:stretch>
@@ -3388,8 +3826,8 @@
           </p:nvSpPr>
           <p:spPr>
             <a:xfrm>
-              <a:off x="2233781" y="1135655"/>
-              <a:ext cx="1158688" cy="56362"/>
+              <a:off x="2353725" y="1135041"/>
+              <a:ext cx="841321" cy="56362"/>
             </a:xfrm>
             <a:prstGeom prst="rect">
               <a:avLst/>
@@ -3433,22 +3871,24 @@
         </p:nvGrpSpPr>
         <p:grpSpPr>
           <a:xfrm>
-            <a:off x="3041526" y="1074278"/>
-            <a:ext cx="875765" cy="151944"/>
-            <a:chOff x="3162556" y="1046587"/>
-            <a:chExt cx="972539" cy="181141"/>
+            <a:off x="3005242" y="1009821"/>
+            <a:ext cx="834689" cy="136056"/>
+            <a:chOff x="3135692" y="1073622"/>
+            <a:chExt cx="926924" cy="162201"/>
           </a:xfrm>
         </p:grpSpPr>
         <p:sp>
           <p:nvSpPr>
             <p:cNvPr id="7" name="Freeform 7"/>
-            <p:cNvSpPr/>
+            <p:cNvSpPr>
+              <a:spLocks noChangeAspect="1"/>
+            </p:cNvSpPr>
             <p:nvPr/>
           </p:nvSpPr>
           <p:spPr>
             <a:xfrm>
-              <a:off x="3162556" y="1046587"/>
-              <a:ext cx="181141" cy="181141"/>
+              <a:off x="3135692" y="1073622"/>
+              <a:ext cx="137213" cy="162201"/>
             </a:xfrm>
             <a:custGeom>
               <a:avLst/>
@@ -3478,7 +3918,7 @@
               </a:pathLst>
             </a:custGeom>
             <a:blipFill>
-              <a:blip r:embed="rId5"/>
+              <a:blip r:embed="rId6"/>
               <a:stretch>
                 <a:fillRect/>
               </a:stretch>
@@ -3500,7 +3940,7 @@
           </p:nvSpPr>
           <p:spPr>
             <a:xfrm>
-              <a:off x="3384527" y="1132792"/>
+              <a:off x="3312048" y="1148352"/>
               <a:ext cx="750568" cy="67192"/>
             </a:xfrm>
             <a:prstGeom prst="rect">
@@ -3596,7 +4036,7 @@
               </a:lnSpc>
             </a:pPr>
             <a:r>
-              <a:rPr lang="pt-BR" sz="863" dirty="0">
+              <a:rPr lang="en-US" sz="863" dirty="0">
                 <a:solidFill>
                   <a:srgbClr val="000000"/>
                 </a:solidFill>
@@ -3604,12 +4044,6 @@
               </a:rPr>
               <a:t>CARGOPT</a:t>
             </a:r>
-            <a:endParaRPr lang="en-US" sz="863" dirty="0">
-              <a:solidFill>
-                <a:srgbClr val="000000"/>
-              </a:solidFill>
-              <a:latin typeface="Montserrat Semi-Bold Bold"/>
-            </a:endParaRPr>
           </a:p>
         </p:txBody>
       </p:sp>
@@ -3665,8 +4099,8 @@
         </p:nvSpPr>
         <p:spPr>
           <a:xfrm>
-            <a:off x="2247009" y="864629"/>
-            <a:ext cx="1187726" cy="120739"/>
+            <a:off x="2211063" y="815536"/>
+            <a:ext cx="1187726" cy="115673"/>
           </a:xfrm>
           <a:prstGeom prst="rect">
             <a:avLst/>
@@ -3684,7 +4118,7 @@
               </a:lnSpc>
             </a:pPr>
             <a:r>
-              <a:rPr lang="en-US" sz="1294" dirty="0">
+              <a:rPr lang="en-US" sz="1100" dirty="0">
                 <a:solidFill>
                   <a:srgbClr val="000000"/>
                 </a:solidFill>
@@ -3698,13 +4132,15 @@
       <p:sp>
         <p:nvSpPr>
           <p:cNvPr id="16" name="Freeform 16"/>
-          <p:cNvSpPr/>
+          <p:cNvSpPr>
+            <a:spLocks noChangeAspect="1"/>
+          </p:cNvSpPr>
           <p:nvPr/>
         </p:nvSpPr>
         <p:spPr>
           <a:xfrm>
-            <a:off x="2022803" y="815359"/>
-            <a:ext cx="181141" cy="181141"/>
+            <a:off x="2023370" y="780822"/>
+            <a:ext cx="150387" cy="150387"/>
           </a:xfrm>
           <a:custGeom>
             <a:avLst/>
@@ -3734,7 +4170,7 @@
             </a:pathLst>
           </a:custGeom>
           <a:blipFill>
-            <a:blip r:embed="rId6"/>
+            <a:blip r:embed="rId7"/>
             <a:stretch>
               <a:fillRect/>
             </a:stretch>
@@ -3744,7 +4180,7 @@
           <a:bodyPr/>
           <a:lstStyle/>
           <a:p>
-            <a:endParaRPr sz="1047"/>
+            <a:endParaRPr sz="1047" dirty="0"/>
           </a:p>
         </p:txBody>
       </p:sp>
@@ -3793,7 +4229,7 @@
             </a:pathLst>
           </a:custGeom>
           <a:blipFill>
-            <a:blip r:embed="rId7"/>
+            <a:blip r:embed="rId8"/>
             <a:stretch>
               <a:fillRect/>
             </a:stretch>
@@ -3822,7 +4258,7 @@
           <p:nvPr/>
         </p:nvPicPr>
         <p:blipFill>
-          <a:blip r:embed="rId8" cstate="print">
+          <a:blip r:embed="rId9" cstate="print">
             <a:extLst>
               <a:ext uri="{28A0092B-C50C-407E-A947-70E740481C1C}">
                 <a14:useLocalDpi xmlns:a14="http://schemas.microsoft.com/office/drawing/2010/main" val="0"/>
@@ -3844,6 +4280,11 @@
         </p:spPr>
       </p:pic>
     </p:spTree>
+    <p:extLst>
+      <p:ext uri="{BB962C8B-B14F-4D97-AF65-F5344CB8AC3E}">
+        <p14:creationId xmlns:p14="http://schemas.microsoft.com/office/powerpoint/2010/main" val="2450551215"/>
+      </p:ext>
+    </p:extLst>
   </p:cSld>
   <p:clrMapOvr>
     <a:masterClrMapping/>
@@ -4152,4 +4593,319 @@
   </a:objectDefaults>
   <a:extraClrSchemeLst/>
 </a:theme>
+</file>
+
+<file path=ppt/theme/theme2.xml><?xml version="1.0" encoding="utf-8"?>
+<a:theme xmlns:a="http://schemas.openxmlformats.org/drawingml/2006/main" name="Tema do Office">
+  <a:themeElements>
+    <a:clrScheme name="Office">
+      <a:dk1>
+        <a:sysClr val="windowText" lastClr="000000"/>
+      </a:dk1>
+      <a:lt1>
+        <a:sysClr val="window" lastClr="FFFFFF"/>
+      </a:lt1>
+      <a:dk2>
+        <a:srgbClr val="0E2841"/>
+      </a:dk2>
+      <a:lt2>
+        <a:srgbClr val="E8E8E8"/>
+      </a:lt2>
+      <a:accent1>
+        <a:srgbClr val="156082"/>
+      </a:accent1>
+      <a:accent2>
+        <a:srgbClr val="E97132"/>
+      </a:accent2>
+      <a:accent3>
+        <a:srgbClr val="196B24"/>
+      </a:accent3>
+      <a:accent4>
+        <a:srgbClr val="0F9ED5"/>
+      </a:accent4>
+      <a:accent5>
+        <a:srgbClr val="A02B93"/>
+      </a:accent5>
+      <a:accent6>
+        <a:srgbClr val="4EA72E"/>
+      </a:accent6>
+      <a:hlink>
+        <a:srgbClr val="467886"/>
+      </a:hlink>
+      <a:folHlink>
+        <a:srgbClr val="96607D"/>
+      </a:folHlink>
+    </a:clrScheme>
+    <a:fontScheme name="Office">
+      <a:majorFont>
+        <a:latin typeface="Aptos Display" panose="02110004020202020204"/>
+        <a:ea typeface=""/>
+        <a:cs typeface=""/>
+        <a:font script="Jpan" typeface="游ゴシック Light"/>
+        <a:font script="Hang" typeface="맑은 고딕"/>
+        <a:font script="Hans" typeface="等线 Light"/>
+        <a:font script="Hant" typeface="新細明體"/>
+        <a:font script="Arab" typeface="Times New Roman"/>
+        <a:font script="Hebr" typeface="Times New Roman"/>
+        <a:font script="Thai" typeface="Angsana New"/>
+        <a:font script="Ethi" typeface="Nyala"/>
+        <a:font script="Beng" typeface="Vrinda"/>
+        <a:font script="Gujr" typeface="Shruti"/>
+        <a:font script="Khmr" typeface="MoolBoran"/>
+        <a:font script="Knda" typeface="Tunga"/>
+        <a:font script="Guru" typeface="Raavi"/>
+        <a:font script="Cans" typeface="Euphemia"/>
+        <a:font script="Cher" typeface="Plantagenet Cherokee"/>
+        <a:font script="Yiii" typeface="Microsoft Yi Baiti"/>
+        <a:font script="Tibt" typeface="Microsoft Himalaya"/>
+        <a:font script="Thaa" typeface="MV Boli"/>
+        <a:font script="Deva" typeface="Mangal"/>
+        <a:font script="Telu" typeface="Gautami"/>
+        <a:font script="Taml" typeface="Latha"/>
+        <a:font script="Syrc" typeface="Estrangelo Edessa"/>
+        <a:font script="Orya" typeface="Kalinga"/>
+        <a:font script="Mlym" typeface="Kartika"/>
+        <a:font script="Laoo" typeface="DokChampa"/>
+        <a:font script="Sinh" typeface="Iskoola Pota"/>
+        <a:font script="Mong" typeface="Mongolian Baiti"/>
+        <a:font script="Viet" typeface="Times New Roman"/>
+        <a:font script="Uigh" typeface="Microsoft Uighur"/>
+        <a:font script="Geor" typeface="Sylfaen"/>
+        <a:font script="Armn" typeface="Arial"/>
+        <a:font script="Bugi" typeface="Leelawadee UI"/>
+        <a:font script="Bopo" typeface="Microsoft JhengHei"/>
+        <a:font script="Java" typeface="Javanese Text"/>
+        <a:font script="Lisu" typeface="Segoe UI"/>
+        <a:font script="Mymr" typeface="Myanmar Text"/>
+        <a:font script="Nkoo" typeface="Ebrima"/>
+        <a:font script="Olck" typeface="Nirmala UI"/>
+        <a:font script="Osma" typeface="Ebrima"/>
+        <a:font script="Phag" typeface="Phagspa"/>
+        <a:font script="Syrn" typeface="Estrangelo Edessa"/>
+        <a:font script="Syrj" typeface="Estrangelo Edessa"/>
+        <a:font script="Syre" typeface="Estrangelo Edessa"/>
+        <a:font script="Sora" typeface="Nirmala UI"/>
+        <a:font script="Tale" typeface="Microsoft Tai Le"/>
+        <a:font script="Talu" typeface="Microsoft New Tai Lue"/>
+        <a:font script="Tfng" typeface="Ebrima"/>
+      </a:majorFont>
+      <a:minorFont>
+        <a:latin typeface="Aptos" panose="02110004020202020204"/>
+        <a:ea typeface=""/>
+        <a:cs typeface=""/>
+        <a:font script="Jpan" typeface="游ゴシック"/>
+        <a:font script="Hang" typeface="맑은 고딕"/>
+        <a:font script="Hans" typeface="等线"/>
+        <a:font script="Hant" typeface="新細明體"/>
+        <a:font script="Arab" typeface="Arial"/>
+        <a:font script="Hebr" typeface="Arial"/>
+        <a:font script="Thai" typeface="Cordia New"/>
+        <a:font script="Ethi" typeface="Nyala"/>
+        <a:font script="Beng" typeface="Vrinda"/>
+        <a:font script="Gujr" typeface="Shruti"/>
+        <a:font script="Khmr" typeface="DaunPenh"/>
+        <a:font script="Knda" typeface="Tunga"/>
+        <a:font script="Guru" typeface="Raavi"/>
+        <a:font script="Cans" typeface="Euphemia"/>
+        <a:font script="Cher" typeface="Plantagenet Cherokee"/>
+        <a:font script="Yiii" typeface="Microsoft Yi Baiti"/>
+        <a:font script="Tibt" typeface="Microsoft Himalaya"/>
+        <a:font script="Thaa" typeface="MV Boli"/>
+        <a:font script="Deva" typeface="Mangal"/>
+        <a:font script="Telu" typeface="Gautami"/>
+        <a:font script="Taml" typeface="Latha"/>
+        <a:font script="Syrc" typeface="Estrangelo Edessa"/>
+        <a:font script="Orya" typeface="Kalinga"/>
+        <a:font script="Mlym" typeface="Kartika"/>
+        <a:font script="Laoo" typeface="DokChampa"/>
+        <a:font script="Sinh" typeface="Iskoola Pota"/>
+        <a:font script="Mong" typeface="Mongolian Baiti"/>
+        <a:font script="Viet" typeface="Arial"/>
+        <a:font script="Uigh" typeface="Microsoft Uighur"/>
+        <a:font script="Geor" typeface="Sylfaen"/>
+        <a:font script="Armn" typeface="Arial"/>
+        <a:font script="Bugi" typeface="Leelawadee UI"/>
+        <a:font script="Bopo" typeface="Microsoft JhengHei"/>
+        <a:font script="Java" typeface="Javanese Text"/>
+        <a:font script="Lisu" typeface="Segoe UI"/>
+        <a:font script="Mymr" typeface="Myanmar Text"/>
+        <a:font script="Nkoo" typeface="Ebrima"/>
+        <a:font script="Olck" typeface="Nirmala UI"/>
+        <a:font script="Osma" typeface="Ebrima"/>
+        <a:font script="Phag" typeface="Phagspa"/>
+        <a:font script="Syrn" typeface="Estrangelo Edessa"/>
+        <a:font script="Syrj" typeface="Estrangelo Edessa"/>
+        <a:font script="Syre" typeface="Estrangelo Edessa"/>
+        <a:font script="Sora" typeface="Nirmala UI"/>
+        <a:font script="Tale" typeface="Microsoft Tai Le"/>
+        <a:font script="Talu" typeface="Microsoft New Tai Lue"/>
+        <a:font script="Tfng" typeface="Ebrima"/>
+      </a:minorFont>
+    </a:fontScheme>
+    <a:fmtScheme name="Office">
+      <a:fillStyleLst>
+        <a:solidFill>
+          <a:schemeClr val="phClr"/>
+        </a:solidFill>
+        <a:gradFill rotWithShape="1">
+          <a:gsLst>
+            <a:gs pos="0">
+              <a:schemeClr val="phClr">
+                <a:lumMod val="110000"/>
+                <a:satMod val="105000"/>
+                <a:tint val="67000"/>
+              </a:schemeClr>
+            </a:gs>
+            <a:gs pos="50000">
+              <a:schemeClr val="phClr">
+                <a:lumMod val="105000"/>
+                <a:satMod val="103000"/>
+                <a:tint val="73000"/>
+              </a:schemeClr>
+            </a:gs>
+            <a:gs pos="100000">
+              <a:schemeClr val="phClr">
+                <a:lumMod val="105000"/>
+                <a:satMod val="109000"/>
+                <a:tint val="81000"/>
+              </a:schemeClr>
+            </a:gs>
+          </a:gsLst>
+          <a:lin ang="5400000" scaled="0"/>
+        </a:gradFill>
+        <a:gradFill rotWithShape="1">
+          <a:gsLst>
+            <a:gs pos="0">
+              <a:schemeClr val="phClr">
+                <a:satMod val="103000"/>
+                <a:lumMod val="102000"/>
+                <a:tint val="94000"/>
+              </a:schemeClr>
+            </a:gs>
+            <a:gs pos="50000">
+              <a:schemeClr val="phClr">
+                <a:satMod val="110000"/>
+                <a:lumMod val="100000"/>
+                <a:shade val="100000"/>
+              </a:schemeClr>
+            </a:gs>
+            <a:gs pos="100000">
+              <a:schemeClr val="phClr">
+                <a:lumMod val="99000"/>
+                <a:satMod val="120000"/>
+                <a:shade val="78000"/>
+              </a:schemeClr>
+            </a:gs>
+          </a:gsLst>
+          <a:lin ang="5400000" scaled="0"/>
+        </a:gradFill>
+      </a:fillStyleLst>
+      <a:lnStyleLst>
+        <a:ln w="12700" cap="flat" cmpd="sng" algn="ctr">
+          <a:solidFill>
+            <a:schemeClr val="phClr"/>
+          </a:solidFill>
+          <a:prstDash val="solid"/>
+          <a:miter lim="800000"/>
+        </a:ln>
+        <a:ln w="19050" cap="flat" cmpd="sng" algn="ctr">
+          <a:solidFill>
+            <a:schemeClr val="phClr"/>
+          </a:solidFill>
+          <a:prstDash val="solid"/>
+          <a:miter lim="800000"/>
+        </a:ln>
+        <a:ln w="25400" cap="flat" cmpd="sng" algn="ctr">
+          <a:solidFill>
+            <a:schemeClr val="phClr"/>
+          </a:solidFill>
+          <a:prstDash val="solid"/>
+          <a:miter lim="800000"/>
+        </a:ln>
+      </a:lnStyleLst>
+      <a:effectStyleLst>
+        <a:effectStyle>
+          <a:effectLst/>
+        </a:effectStyle>
+        <a:effectStyle>
+          <a:effectLst/>
+        </a:effectStyle>
+        <a:effectStyle>
+          <a:effectLst>
+            <a:outerShdw blurRad="57150" dist="19050" dir="5400000" algn="ctr" rotWithShape="0">
+              <a:srgbClr val="000000">
+                <a:alpha val="63000"/>
+              </a:srgbClr>
+            </a:outerShdw>
+          </a:effectLst>
+        </a:effectStyle>
+      </a:effectStyleLst>
+      <a:bgFillStyleLst>
+        <a:solidFill>
+          <a:schemeClr val="phClr"/>
+        </a:solidFill>
+        <a:solidFill>
+          <a:schemeClr val="phClr">
+            <a:tint val="95000"/>
+            <a:satMod val="170000"/>
+          </a:schemeClr>
+        </a:solidFill>
+        <a:gradFill rotWithShape="1">
+          <a:gsLst>
+            <a:gs pos="0">
+              <a:schemeClr val="phClr">
+                <a:tint val="93000"/>
+                <a:satMod val="150000"/>
+                <a:shade val="98000"/>
+                <a:lumMod val="102000"/>
+              </a:schemeClr>
+            </a:gs>
+            <a:gs pos="50000">
+              <a:schemeClr val="phClr">
+                <a:tint val="98000"/>
+                <a:satMod val="130000"/>
+                <a:shade val="90000"/>
+                <a:lumMod val="103000"/>
+              </a:schemeClr>
+            </a:gs>
+            <a:gs pos="100000">
+              <a:schemeClr val="phClr">
+                <a:shade val="63000"/>
+                <a:satMod val="120000"/>
+              </a:schemeClr>
+            </a:gs>
+          </a:gsLst>
+          <a:lin ang="5400000" scaled="0"/>
+        </a:gradFill>
+      </a:bgFillStyleLst>
+    </a:fmtScheme>
+  </a:themeElements>
+  <a:objectDefaults>
+    <a:lnDef>
+      <a:spPr/>
+      <a:bodyPr/>
+      <a:lstStyle/>
+      <a:style>
+        <a:lnRef idx="2">
+          <a:schemeClr val="accent1"/>
+        </a:lnRef>
+        <a:fillRef idx="0">
+          <a:schemeClr val="accent1"/>
+        </a:fillRef>
+        <a:effectRef idx="1">
+          <a:schemeClr val="accent1"/>
+        </a:effectRef>
+        <a:fontRef idx="minor">
+          <a:schemeClr val="tx1"/>
+        </a:fontRef>
+      </a:style>
+    </a:lnDef>
+  </a:objectDefaults>
+  <a:extraClrSchemeLst/>
+  <a:extLst>
+    <a:ext uri="{05A4C25C-085E-4340-85A3-A5531E510DB2}">
+      <thm15:themeFamily xmlns:thm15="http://schemas.microsoft.com/office/thememl/2012/main" name="Office Theme" id="{2E142A2C-CD16-42D6-873A-C26D2A0506FA}" vid="{1BDDFF52-6CD6-40A5-AB3C-68EB2F1E4D0A}"/>
+    </a:ext>
+  </a:extLst>
+</a:theme>
 </file>
</xml_diff>

<commit_message>
Atualizar assinatura com novos selos
</commit_message>
<xml_diff>
--- a/Assinatura e-mail Schwarz.pptx
+++ b/Assinatura e-mail Schwarz.pptx
@@ -14,16 +14,18 @@
   <p:notesSz cx="6858000" cy="9144000"/>
   <p:embeddedFontLst>
     <p:embeddedFont>
-      <p:font typeface="Montserrat Classic" panose="020B0604020202020204" charset="0"/>
+      <p:font typeface="Montserrat Medium" panose="00000600000000000000" pitchFamily="2" charset="0"/>
       <p:regular r:id="rId4"/>
+      <p:italic r:id="rId5"/>
     </p:embeddedFont>
     <p:embeddedFont>
-      <p:font typeface="Montserrat Semi-Bold Bold" panose="020B0604020202020204" charset="0"/>
-      <p:regular r:id="rId5"/>
+      <p:font typeface="Montserrat SemiBold" panose="00000700000000000000" pitchFamily="2" charset="0"/>
+      <p:bold r:id="rId6"/>
+      <p:boldItalic r:id="rId7"/>
     </p:embeddedFont>
     <p:embeddedFont>
-      <p:font typeface="Pathway Gothic One" panose="020B0604020202020204" charset="0"/>
-      <p:regular r:id="rId6"/>
+      <p:font typeface="Pathway Gothic One" pitchFamily="2" charset="0"/>
+      <p:regular r:id="rId8"/>
     </p:embeddedFont>
   </p:embeddedFontLst>
   <p:defaultTextStyle>
@@ -222,7 +224,7 @@
           <a:p>
             <a:fld id="{0033826D-BF54-438B-9707-919959F77F61}" type="datetimeFigureOut">
               <a:rPr lang="pt-BR" smtClean="0"/>
-              <a:t>04/09/2024</a:t>
+              <a:t>22/11/2024</a:t>
             </a:fld>
             <a:endParaRPr lang="pt-BR"/>
           </a:p>
@@ -753,7 +755,7 @@
             <a:fld id="{1D8BD707-D9CF-40AE-B4C6-C98DA3205C09}" type="datetimeFigureOut">
               <a:rPr lang="en-US" smtClean="0"/>
               <a:pPr/>
-              <a:t>9/4/2024</a:t>
+              <a:t>11/22/2024</a:t>
             </a:fld>
             <a:endParaRPr lang="en-US"/>
           </a:p>
@@ -918,7 +920,7 @@
             <a:fld id="{1D8BD707-D9CF-40AE-B4C6-C98DA3205C09}" type="datetimeFigureOut">
               <a:rPr lang="en-US" smtClean="0"/>
               <a:pPr/>
-              <a:t>9/4/2024</a:t>
+              <a:t>11/22/2024</a:t>
             </a:fld>
             <a:endParaRPr lang="en-US"/>
           </a:p>
@@ -1093,7 +1095,7 @@
             <a:fld id="{1D8BD707-D9CF-40AE-B4C6-C98DA3205C09}" type="datetimeFigureOut">
               <a:rPr lang="en-US" smtClean="0"/>
               <a:pPr/>
-              <a:t>9/4/2024</a:t>
+              <a:t>11/22/2024</a:t>
             </a:fld>
             <a:endParaRPr lang="en-US"/>
           </a:p>
@@ -1258,7 +1260,7 @@
             <a:fld id="{1D8BD707-D9CF-40AE-B4C6-C98DA3205C09}" type="datetimeFigureOut">
               <a:rPr lang="en-US" smtClean="0"/>
               <a:pPr/>
-              <a:t>9/4/2024</a:t>
+              <a:t>11/22/2024</a:t>
             </a:fld>
             <a:endParaRPr lang="en-US"/>
           </a:p>
@@ -1500,7 +1502,7 @@
             <a:fld id="{1D8BD707-D9CF-40AE-B4C6-C98DA3205C09}" type="datetimeFigureOut">
               <a:rPr lang="en-US" smtClean="0"/>
               <a:pPr/>
-              <a:t>9/4/2024</a:t>
+              <a:t>11/22/2024</a:t>
             </a:fld>
             <a:endParaRPr lang="en-US"/>
           </a:p>
@@ -1782,7 +1784,7 @@
             <a:fld id="{1D8BD707-D9CF-40AE-B4C6-C98DA3205C09}" type="datetimeFigureOut">
               <a:rPr lang="en-US" smtClean="0"/>
               <a:pPr/>
-              <a:t>9/4/2024</a:t>
+              <a:t>11/22/2024</a:t>
             </a:fld>
             <a:endParaRPr lang="en-US"/>
           </a:p>
@@ -2198,7 +2200,7 @@
             <a:fld id="{1D8BD707-D9CF-40AE-B4C6-C98DA3205C09}" type="datetimeFigureOut">
               <a:rPr lang="en-US" smtClean="0"/>
               <a:pPr/>
-              <a:t>9/4/2024</a:t>
+              <a:t>11/22/2024</a:t>
             </a:fld>
             <a:endParaRPr lang="en-US"/>
           </a:p>
@@ -2312,7 +2314,7 @@
             <a:fld id="{1D8BD707-D9CF-40AE-B4C6-C98DA3205C09}" type="datetimeFigureOut">
               <a:rPr lang="en-US" smtClean="0"/>
               <a:pPr/>
-              <a:t>9/4/2024</a:t>
+              <a:t>11/22/2024</a:t>
             </a:fld>
             <a:endParaRPr lang="en-US"/>
           </a:p>
@@ -2404,7 +2406,7 @@
             <a:fld id="{1D8BD707-D9CF-40AE-B4C6-C98DA3205C09}" type="datetimeFigureOut">
               <a:rPr lang="en-US" smtClean="0"/>
               <a:pPr/>
-              <a:t>9/4/2024</a:t>
+              <a:t>11/22/2024</a:t>
             </a:fld>
             <a:endParaRPr lang="en-US"/>
           </a:p>
@@ -2676,7 +2678,7 @@
             <a:fld id="{1D8BD707-D9CF-40AE-B4C6-C98DA3205C09}" type="datetimeFigureOut">
               <a:rPr lang="en-US" smtClean="0"/>
               <a:pPr/>
-              <a:t>9/4/2024</a:t>
+              <a:t>11/22/2024</a:t>
             </a:fld>
             <a:endParaRPr lang="en-US"/>
           </a:p>
@@ -2925,7 +2927,7 @@
             <a:fld id="{1D8BD707-D9CF-40AE-B4C6-C98DA3205C09}" type="datetimeFigureOut">
               <a:rPr lang="en-US" smtClean="0"/>
               <a:pPr/>
-              <a:t>9/4/2024</a:t>
+              <a:t>11/22/2024</a:t>
             </a:fld>
             <a:endParaRPr lang="en-US"/>
           </a:p>
@@ -3133,7 +3135,7 @@
             <a:fld id="{1D8BD707-D9CF-40AE-B4C6-C98DA3205C09}" type="datetimeFigureOut">
               <a:rPr lang="en-US" smtClean="0"/>
               <a:pPr/>
-              <a:t>9/4/2024</a:t>
+              <a:t>11/22/2024</a:t>
             </a:fld>
             <a:endParaRPr lang="en-US"/>
           </a:p>
@@ -3512,7 +3514,7 @@
         </p:nvSpPr>
         <p:spPr>
           <a:xfrm>
-            <a:off x="1388762" y="34494"/>
+            <a:off x="1035844" y="34494"/>
             <a:ext cx="5034" cy="1296000"/>
           </a:xfrm>
           <a:custGeom>
@@ -3698,8 +3700,8 @@
         </p:nvSpPr>
         <p:spPr>
           <a:xfrm>
-            <a:off x="16218" y="488690"/>
-            <a:ext cx="1321908" cy="415545"/>
+            <a:off x="25438" y="537893"/>
+            <a:ext cx="981163" cy="309594"/>
           </a:xfrm>
           <a:custGeom>
             <a:avLst/>
@@ -3743,234 +3745,6 @@
           </a:p>
         </p:txBody>
       </p:sp>
-      <p:grpSp>
-        <p:nvGrpSpPr>
-          <p:cNvPr id="17" name="Agrupar 16">
-            <a:extLst>
-              <a:ext uri="{FF2B5EF4-FFF2-40B4-BE49-F238E27FC236}">
-                <a16:creationId xmlns:a16="http://schemas.microsoft.com/office/drawing/2014/main" id="{ED6F6509-961E-1B0D-1646-ED5F21FDC5AC}"/>
-              </a:ext>
-            </a:extLst>
-          </p:cNvPr>
-          <p:cNvGrpSpPr/>
-          <p:nvPr/>
-        </p:nvGrpSpPr>
-        <p:grpSpPr>
-          <a:xfrm>
-            <a:off x="2033342" y="1006475"/>
-            <a:ext cx="901794" cy="136056"/>
-            <a:chOff x="2213956" y="1071790"/>
-            <a:chExt cx="981090" cy="136056"/>
-          </a:xfrm>
-        </p:grpSpPr>
-        <p:sp>
-          <p:nvSpPr>
-            <p:cNvPr id="6" name="Freeform 6"/>
-            <p:cNvSpPr>
-              <a:spLocks noChangeAspect="1"/>
-            </p:cNvSpPr>
-            <p:nvPr/>
-          </p:nvSpPr>
-          <p:spPr>
-            <a:xfrm>
-              <a:off x="2213956" y="1071790"/>
-              <a:ext cx="136056" cy="136056"/>
-            </a:xfrm>
-            <a:custGeom>
-              <a:avLst/>
-              <a:gdLst/>
-              <a:ahLst/>
-              <a:cxnLst/>
-              <a:rect l="l" t="t" r="r" b="b"/>
-              <a:pathLst>
-                <a:path w="106499" h="106499">
-                  <a:moveTo>
-                    <a:pt x="0" y="0"/>
-                  </a:moveTo>
-                  <a:lnTo>
-                    <a:pt x="106499" y="0"/>
-                  </a:lnTo>
-                  <a:lnTo>
-                    <a:pt x="106499" y="106499"/>
-                  </a:lnTo>
-                  <a:lnTo>
-                    <a:pt x="0" y="106499"/>
-                  </a:lnTo>
-                  <a:lnTo>
-                    <a:pt x="0" y="0"/>
-                  </a:lnTo>
-                  <a:close/>
-                </a:path>
-              </a:pathLst>
-            </a:custGeom>
-            <a:blipFill>
-              <a:blip r:embed="rId5"/>
-              <a:stretch>
-                <a:fillRect/>
-              </a:stretch>
-            </a:blipFill>
-          </p:spPr>
-          <p:txBody>
-            <a:bodyPr/>
-            <a:lstStyle/>
-            <a:p>
-              <a:endParaRPr sz="1047"/>
-            </a:p>
-          </p:txBody>
-        </p:sp>
-        <p:sp>
-          <p:nvSpPr>
-            <p:cNvPr id="11" name="TextBox 11"/>
-            <p:cNvSpPr txBox="1"/>
-            <p:nvPr/>
-          </p:nvSpPr>
-          <p:spPr>
-            <a:xfrm>
-              <a:off x="2353725" y="1135041"/>
-              <a:ext cx="841321" cy="56362"/>
-            </a:xfrm>
-            <a:prstGeom prst="rect">
-              <a:avLst/>
-            </a:prstGeom>
-          </p:spPr>
-          <p:txBody>
-            <a:bodyPr wrap="square" lIns="0" tIns="0" rIns="0" bIns="0" rtlCol="0" anchor="t">
-              <a:spAutoFit/>
-            </a:bodyPr>
-            <a:lstStyle/>
-            <a:p>
-              <a:pPr algn="ctr">
-                <a:lnSpc>
-                  <a:spcPts val="443"/>
-                </a:lnSpc>
-              </a:pPr>
-              <a:r>
-                <a:rPr lang="en-US" sz="719" spc="-3" dirty="0">
-                  <a:solidFill>
-                    <a:srgbClr val="000000"/>
-                  </a:solidFill>
-                  <a:latin typeface="Montserrat Classic"/>
-                </a:rPr>
-                <a:t>@SCHWARZ-SA</a:t>
-              </a:r>
-            </a:p>
-          </p:txBody>
-        </p:sp>
-      </p:grpSp>
-      <p:grpSp>
-        <p:nvGrpSpPr>
-          <p:cNvPr id="19" name="Agrupar 18">
-            <a:extLst>
-              <a:ext uri="{FF2B5EF4-FFF2-40B4-BE49-F238E27FC236}">
-                <a16:creationId xmlns:a16="http://schemas.microsoft.com/office/drawing/2014/main" id="{5EF80789-787C-E01F-0EBD-086844CF60F8}"/>
-              </a:ext>
-            </a:extLst>
-          </p:cNvPr>
-          <p:cNvGrpSpPr/>
-          <p:nvPr/>
-        </p:nvGrpSpPr>
-        <p:grpSpPr>
-          <a:xfrm>
-            <a:off x="3005242" y="1009821"/>
-            <a:ext cx="834689" cy="136056"/>
-            <a:chOff x="3135692" y="1073622"/>
-            <a:chExt cx="926924" cy="162201"/>
-          </a:xfrm>
-        </p:grpSpPr>
-        <p:sp>
-          <p:nvSpPr>
-            <p:cNvPr id="7" name="Freeform 7"/>
-            <p:cNvSpPr>
-              <a:spLocks noChangeAspect="1"/>
-            </p:cNvSpPr>
-            <p:nvPr/>
-          </p:nvSpPr>
-          <p:spPr>
-            <a:xfrm>
-              <a:off x="3135692" y="1073622"/>
-              <a:ext cx="137213" cy="162201"/>
-            </a:xfrm>
-            <a:custGeom>
-              <a:avLst/>
-              <a:gdLst/>
-              <a:ahLst/>
-              <a:cxnLst/>
-              <a:rect l="l" t="t" r="r" b="b"/>
-              <a:pathLst>
-                <a:path w="103082" h="103082">
-                  <a:moveTo>
-                    <a:pt x="0" y="0"/>
-                  </a:moveTo>
-                  <a:lnTo>
-                    <a:pt x="103083" y="0"/>
-                  </a:lnTo>
-                  <a:lnTo>
-                    <a:pt x="103083" y="103082"/>
-                  </a:lnTo>
-                  <a:lnTo>
-                    <a:pt x="0" y="103082"/>
-                  </a:lnTo>
-                  <a:lnTo>
-                    <a:pt x="0" y="0"/>
-                  </a:lnTo>
-                  <a:close/>
-                </a:path>
-              </a:pathLst>
-            </a:custGeom>
-            <a:blipFill>
-              <a:blip r:embed="rId6"/>
-              <a:stretch>
-                <a:fillRect/>
-              </a:stretch>
-            </a:blipFill>
-          </p:spPr>
-          <p:txBody>
-            <a:bodyPr/>
-            <a:lstStyle/>
-            <a:p>
-              <a:endParaRPr sz="1047"/>
-            </a:p>
-          </p:txBody>
-        </p:sp>
-        <p:sp>
-          <p:nvSpPr>
-            <p:cNvPr id="12" name="TextBox 12"/>
-            <p:cNvSpPr txBox="1"/>
-            <p:nvPr/>
-          </p:nvSpPr>
-          <p:spPr>
-            <a:xfrm>
-              <a:off x="3312048" y="1148352"/>
-              <a:ext cx="750568" cy="67192"/>
-            </a:xfrm>
-            <a:prstGeom prst="rect">
-              <a:avLst/>
-            </a:prstGeom>
-          </p:spPr>
-          <p:txBody>
-            <a:bodyPr wrap="square" lIns="0" tIns="0" rIns="0" bIns="0" rtlCol="0" anchor="t">
-              <a:spAutoFit/>
-            </a:bodyPr>
-            <a:lstStyle/>
-            <a:p>
-              <a:pPr>
-                <a:lnSpc>
-                  <a:spcPts val="443"/>
-                </a:lnSpc>
-              </a:pPr>
-              <a:r>
-                <a:rPr lang="en-US" sz="719" spc="-3" dirty="0">
-                  <a:solidFill>
-                    <a:srgbClr val="000000"/>
-                  </a:solidFill>
-                  <a:latin typeface="Montserrat Classic"/>
-                </a:rPr>
-                <a:t>/SCHWARZ.SA</a:t>
-              </a:r>
-            </a:p>
-          </p:txBody>
-        </p:sp>
-      </p:grpSp>
       <p:sp>
         <p:nvSpPr>
           <p:cNvPr id="13" name="TextBox 13"/>
@@ -3979,16 +3753,16 @@
         </p:nvSpPr>
         <p:spPr>
           <a:xfrm>
-            <a:off x="1439753" y="244475"/>
-            <a:ext cx="2483048" cy="234218"/>
+            <a:off x="1086835" y="168275"/>
+            <a:ext cx="2255057" cy="234218"/>
           </a:xfrm>
           <a:prstGeom prst="rect">
             <a:avLst/>
           </a:prstGeom>
         </p:spPr>
         <p:txBody>
-          <a:bodyPr wrap="square" lIns="0" tIns="0" rIns="0" bIns="0" rtlCol="0" anchor="t">
-            <a:normAutofit/>
+          <a:bodyPr wrap="square" lIns="0" tIns="0" rIns="0" bIns="0" rtlCol="0" anchor="ctr">
+            <a:noAutofit/>
           </a:bodyPr>
           <a:lstStyle/>
           <a:p>
@@ -4017,8 +3791,8 @@
         </p:nvSpPr>
         <p:spPr>
           <a:xfrm>
-            <a:off x="1440232" y="465337"/>
-            <a:ext cx="2596160" cy="89554"/>
+            <a:off x="1086033" y="464758"/>
+            <a:ext cx="2232000" cy="89554"/>
           </a:xfrm>
           <a:prstGeom prst="rect">
             <a:avLst/>
@@ -4026,7 +3800,7 @@
         </p:spPr>
         <p:txBody>
           <a:bodyPr wrap="square" lIns="0" tIns="0" rIns="0" bIns="0" rtlCol="0" anchor="t">
-            <a:normAutofit/>
+            <a:noAutofit/>
           </a:bodyPr>
           <a:lstStyle/>
           <a:p>
@@ -4040,7 +3814,7 @@
                 <a:solidFill>
                   <a:srgbClr val="000000"/>
                 </a:solidFill>
-                <a:latin typeface="Montserrat Semi-Bold Bold"/>
+                <a:latin typeface="Montserrat SemiBold" pitchFamily="2" charset="0"/>
               </a:rPr>
               <a:t>CARGOPT</a:t>
             </a:r>
@@ -4055,8 +3829,8 @@
         </p:nvSpPr>
         <p:spPr>
           <a:xfrm>
-            <a:off x="1440232" y="653945"/>
-            <a:ext cx="2567008" cy="109143"/>
+            <a:off x="1086835" y="655743"/>
+            <a:ext cx="2232000" cy="109143"/>
           </a:xfrm>
           <a:prstGeom prst="rect">
             <a:avLst/>
@@ -4064,30 +3838,215 @@
         </p:spPr>
         <p:txBody>
           <a:bodyPr wrap="square" lIns="0" tIns="0" rIns="0" bIns="0" rtlCol="0" anchor="t">
-            <a:normAutofit/>
+            <a:noAutofit/>
           </a:bodyPr>
-          <a:lstStyle/>
-          <a:p>
-            <a:pPr>
+          <a:lstStyle>
+            <a:defPPr>
+              <a:defRPr lang="en-US"/>
+            </a:defPPr>
+            <a:lvl1pPr>
               <a:lnSpc>
                 <a:spcPts val="643"/>
               </a:lnSpc>
-            </a:pPr>
-            <a:r>
-              <a:rPr lang="en-US" sz="863">
+              <a:defRPr sz="863">
                 <a:solidFill>
                   <a:srgbClr val="000000"/>
                 </a:solidFill>
-                <a:latin typeface="Montserrat Semi-Bold Bold"/>
+                <a:latin typeface="Montserrat SemiBold" pitchFamily="2" charset="0"/>
+              </a:defRPr>
+            </a:lvl1pPr>
+          </a:lstStyle>
+          <a:p>
+            <a:r>
+              <a:rPr lang="en-US" dirty="0"/>
+              <a:t>CARGOIN</a:t>
+            </a:r>
+          </a:p>
+        </p:txBody>
+      </p:sp>
+      <p:sp>
+        <p:nvSpPr>
+          <p:cNvPr id="6" name="Freeform 6"/>
+          <p:cNvSpPr>
+            <a:spLocks/>
+          </p:cNvSpPr>
+          <p:nvPr/>
+        </p:nvSpPr>
+        <p:spPr>
+          <a:xfrm>
+            <a:off x="1666285" y="1214247"/>
+            <a:ext cx="151200" cy="151200"/>
+          </a:xfrm>
+          <a:custGeom>
+            <a:avLst/>
+            <a:gdLst/>
+            <a:ahLst/>
+            <a:cxnLst/>
+            <a:rect l="l" t="t" r="r" b="b"/>
+            <a:pathLst>
+              <a:path w="106499" h="106499">
+                <a:moveTo>
+                  <a:pt x="0" y="0"/>
+                </a:moveTo>
+                <a:lnTo>
+                  <a:pt x="106499" y="0"/>
+                </a:lnTo>
+                <a:lnTo>
+                  <a:pt x="106499" y="106499"/>
+                </a:lnTo>
+                <a:lnTo>
+                  <a:pt x="0" y="106499"/>
+                </a:lnTo>
+                <a:lnTo>
+                  <a:pt x="0" y="0"/>
+                </a:lnTo>
+                <a:close/>
+              </a:path>
+            </a:pathLst>
+          </a:custGeom>
+          <a:blipFill>
+            <a:blip r:embed="rId5"/>
+            <a:stretch>
+              <a:fillRect/>
+            </a:stretch>
+          </a:blipFill>
+        </p:spPr>
+        <p:txBody>
+          <a:bodyPr/>
+          <a:lstStyle/>
+          <a:p>
+            <a:endParaRPr sz="1047"/>
+          </a:p>
+        </p:txBody>
+      </p:sp>
+      <p:sp>
+        <p:nvSpPr>
+          <p:cNvPr id="11" name="TextBox 11"/>
+          <p:cNvSpPr txBox="1"/>
+          <p:nvPr/>
+        </p:nvSpPr>
+        <p:spPr>
+          <a:xfrm>
+            <a:off x="1842696" y="1077413"/>
+            <a:ext cx="773321" cy="61235"/>
+          </a:xfrm>
+          <a:prstGeom prst="rect">
+            <a:avLst/>
+          </a:prstGeom>
+        </p:spPr>
+        <p:txBody>
+          <a:bodyPr wrap="square" lIns="0" tIns="0" rIns="0" bIns="0" rtlCol="0" anchor="t">
+            <a:spAutoFit/>
+          </a:bodyPr>
+          <a:lstStyle/>
+          <a:p>
+            <a:pPr algn="ctr">
+              <a:lnSpc>
+                <a:spcPts val="443"/>
+              </a:lnSpc>
+            </a:pPr>
+            <a:r>
+              <a:rPr lang="en-US" sz="719" spc="-3" dirty="0">
+                <a:solidFill>
+                  <a:srgbClr val="000000"/>
+                </a:solidFill>
+                <a:latin typeface="Montserrat Medium" pitchFamily="2" charset="0"/>
               </a:rPr>
-              <a:t>CARGOIN</a:t>
-            </a:r>
-            <a:endParaRPr lang="en-US" sz="863" dirty="0">
-              <a:solidFill>
-                <a:srgbClr val="000000"/>
-              </a:solidFill>
-              <a:latin typeface="Montserrat Semi-Bold Bold"/>
-            </a:endParaRPr>
+              <a:t>@SCHWARZ-SA</a:t>
+            </a:r>
+          </a:p>
+        </p:txBody>
+      </p:sp>
+      <p:sp>
+        <p:nvSpPr>
+          <p:cNvPr id="7" name="Freeform 7"/>
+          <p:cNvSpPr>
+            <a:spLocks/>
+          </p:cNvSpPr>
+          <p:nvPr/>
+        </p:nvSpPr>
+        <p:spPr>
+          <a:xfrm>
+            <a:off x="1666525" y="1006475"/>
+            <a:ext cx="151200" cy="151200"/>
+          </a:xfrm>
+          <a:custGeom>
+            <a:avLst/>
+            <a:gdLst/>
+            <a:ahLst/>
+            <a:cxnLst/>
+            <a:rect l="l" t="t" r="r" b="b"/>
+            <a:pathLst>
+              <a:path w="103082" h="103082">
+                <a:moveTo>
+                  <a:pt x="0" y="0"/>
+                </a:moveTo>
+                <a:lnTo>
+                  <a:pt x="103083" y="0"/>
+                </a:lnTo>
+                <a:lnTo>
+                  <a:pt x="103083" y="103082"/>
+                </a:lnTo>
+                <a:lnTo>
+                  <a:pt x="0" y="103082"/>
+                </a:lnTo>
+                <a:lnTo>
+                  <a:pt x="0" y="0"/>
+                </a:lnTo>
+                <a:close/>
+              </a:path>
+            </a:pathLst>
+          </a:custGeom>
+          <a:blipFill>
+            <a:blip r:embed="rId6"/>
+            <a:stretch>
+              <a:fillRect/>
+            </a:stretch>
+          </a:blipFill>
+        </p:spPr>
+        <p:txBody>
+          <a:bodyPr/>
+          <a:lstStyle/>
+          <a:p>
+            <a:endParaRPr sz="1047"/>
+          </a:p>
+        </p:txBody>
+      </p:sp>
+      <p:sp>
+        <p:nvSpPr>
+          <p:cNvPr id="12" name="TextBox 12"/>
+          <p:cNvSpPr txBox="1"/>
+          <p:nvPr/>
+        </p:nvSpPr>
+        <p:spPr>
+          <a:xfrm>
+            <a:off x="1883962" y="1277414"/>
+            <a:ext cx="675882" cy="61235"/>
+          </a:xfrm>
+          <a:prstGeom prst="rect">
+            <a:avLst/>
+          </a:prstGeom>
+        </p:spPr>
+        <p:txBody>
+          <a:bodyPr wrap="square" lIns="0" tIns="0" rIns="0" bIns="0" rtlCol="0" anchor="t">
+            <a:spAutoFit/>
+          </a:bodyPr>
+          <a:lstStyle/>
+          <a:p>
+            <a:pPr>
+              <a:lnSpc>
+                <a:spcPts val="443"/>
+              </a:lnSpc>
+            </a:pPr>
+            <a:r>
+              <a:rPr lang="en-US" sz="719" spc="-3" dirty="0">
+                <a:solidFill>
+                  <a:srgbClr val="000000"/>
+                </a:solidFill>
+                <a:latin typeface="Montserrat Medium" pitchFamily="2" charset="0"/>
+              </a:rPr>
+              <a:t>/SCHWARZ.SA</a:t>
+            </a:r>
           </a:p>
         </p:txBody>
       </p:sp>
@@ -4099,7 +4058,7 @@
         </p:nvSpPr>
         <p:spPr>
           <a:xfrm>
-            <a:off x="2211063" y="815536"/>
+            <a:off x="1858145" y="815536"/>
             <a:ext cx="1187726" cy="115673"/>
           </a:xfrm>
           <a:prstGeom prst="rect">
@@ -4139,7 +4098,7 @@
         </p:nvSpPr>
         <p:spPr>
           <a:xfrm>
-            <a:off x="2023370" y="780822"/>
+            <a:off x="1670452" y="780822"/>
             <a:ext cx="150387" cy="150387"/>
           </a:xfrm>
           <a:custGeom>
@@ -4198,7 +4157,7 @@
         </p:nvSpPr>
         <p:spPr>
           <a:xfrm>
-            <a:off x="1466951" y="798285"/>
+            <a:off x="1083477" y="900257"/>
             <a:ext cx="439767" cy="415545"/>
           </a:xfrm>
           <a:custGeom>
@@ -4245,10 +4204,10 @@
       </p:sp>
       <p:pic>
         <p:nvPicPr>
-          <p:cNvPr id="20" name="Imagem 19" descr="Placa vermelha com letras brancas&#10;&#10;Descrição gerada automaticamente com confiança baixa">
+          <p:cNvPr id="21" name="Gráfico 20">
             <a:extLst>
               <a:ext uri="{FF2B5EF4-FFF2-40B4-BE49-F238E27FC236}">
-                <a16:creationId xmlns:a16="http://schemas.microsoft.com/office/drawing/2014/main" id="{0FCC201E-4E25-83B9-5A9E-E7DA5CC72D6B}"/>
+                <a16:creationId xmlns:a16="http://schemas.microsoft.com/office/drawing/2014/main" id="{2BA9B8A8-B126-8CE5-CF9F-763DB3F0B5C7}"/>
               </a:ext>
             </a:extLst>
           </p:cNvPr>
@@ -4258,10 +4217,45 @@
           <p:nvPr/>
         </p:nvPicPr>
         <p:blipFill>
-          <a:blip r:embed="rId9" cstate="print">
+          <a:blip r:embed="rId9">
             <a:extLst>
-              <a:ext uri="{28A0092B-C50C-407E-A947-70E740481C1C}">
-                <a14:useLocalDpi xmlns:a14="http://schemas.microsoft.com/office/drawing/2010/main" val="0"/>
+              <a:ext uri="{96DAC541-7B7A-43D3-8B79-37D633B846F1}">
+                <asvg:svgBlip xmlns:asvg="http://schemas.microsoft.com/office/drawing/2016/SVG/main" r:embed="rId10"/>
+              </a:ext>
+            </a:extLst>
+          </a:blip>
+          <a:srcRect l="4995" t="3878" r="51118" b="1934"/>
+          <a:stretch/>
+        </p:blipFill>
+        <p:spPr>
+          <a:xfrm>
+            <a:off x="4126887" y="-10269"/>
+            <a:ext cx="846012" cy="1411682"/>
+          </a:xfrm>
+          <a:prstGeom prst="rect">
+            <a:avLst/>
+          </a:prstGeom>
+        </p:spPr>
+      </p:pic>
+      <p:pic>
+        <p:nvPicPr>
+          <p:cNvPr id="20" name="Gráfico 19">
+            <a:extLst>
+              <a:ext uri="{FF2B5EF4-FFF2-40B4-BE49-F238E27FC236}">
+                <a16:creationId xmlns:a16="http://schemas.microsoft.com/office/drawing/2014/main" id="{8C506DFA-2EEA-852A-B7D7-D8636207B555}"/>
+              </a:ext>
+            </a:extLst>
+          </p:cNvPr>
+          <p:cNvPicPr>
+            <a:picLocks noChangeAspect="1"/>
+          </p:cNvPicPr>
+          <p:nvPr/>
+        </p:nvPicPr>
+        <p:blipFill>
+          <a:blip r:embed="rId11">
+            <a:extLst>
+              <a:ext uri="{96DAC541-7B7A-43D3-8B79-37D633B846F1}">
+                <asvg:svgBlip xmlns:asvg="http://schemas.microsoft.com/office/drawing/2016/SVG/main" r:embed="rId12"/>
               </a:ext>
             </a:extLst>
           </a:blip>
@@ -4271,8 +4265,8 @@
         </p:blipFill>
         <p:spPr>
           <a:xfrm>
-            <a:off x="4054687" y="-8332"/>
-            <a:ext cx="792143" cy="1376208"/>
+            <a:off x="3346926" y="-12114"/>
+            <a:ext cx="802229" cy="1411682"/>
           </a:xfrm>
           <a:prstGeom prst="rect">
             <a:avLst/>

</xml_diff>